<commit_message>
image fixes for ch 9
</commit_message>
<xml_diff>
--- a/images/design/src/dose-response.pptx
+++ b/images/design/src/dose-response.pptx
@@ -190,7 +190,7 @@
     <inkml:brush xml:id="br0">
       <inkml:brushProperty name="width" value="0.1" units="cm"/>
       <inkml:brushProperty name="height" value="0.1" units="cm"/>
-      <inkml:brushProperty name="color" value="#004F8B"/>
+      <inkml:brushProperty name="color" value="#347FB5"/>
     </inkml:brush>
   </inkml:definitions>
   <inkml:trace contextRef="#ctx0" brushRef="#br0">0 879 24575,'0'-11'0,"0"-4"0,0 6 0,0-7 0,0 7 0,0-7 0,4 7 0,1-7 0,10 3 0,-4-4 0,12 1 0,-16 3 0,7 5 0,-10 1 0,4 6 0,-1-6 0,1 3 0,0-4 0,-1 0 0,6 0 0,0-4 0,0 3 0,3-8 0,-3 8 0,0-3 0,-1 4 0,-4 0 0,0 4 0,-1-3 0,1 6 0,0-6 0,0 3 0,0-8 0,0 3 0,0-3 0,4 4 0,-3-4 0,7 2 0,-6-2 0,2 4 0,-5 4 0,1-3 0,0 2 0,0-2 0,4-2 0,-3 2 0,7-6 0,-7 4 0,7-7 0,-7 7 0,3-3 0,-4 4 0,-1 4 0,1-3 0,0 6 0,-4-5 0,3 1 0,-3-2 0,4-1 0,0 4 0,0-3 0,-1 2 0,1 1 0,0-3 0,-4 3 0,3 0 0,-2-3 0,3 3 0,-1-4 0,1 0 0,0 0 0,0 4 0,0-3 0,-1 3 0,1 0 0,-1-3 0,1 3 0,0-4 0,0 0 0,-1 4 0,-2-3 0,2 6 0,-7-6 0,7 6 0,-3-5 0,4 2 0,0-4 0,0-4 0,0 3 0,0-3 0,0 8 0,-1-3 0,1 6 0,-3-6 0,1 6 0,-2-5 0,4 1 0,0-7 0,0 4 0,0-4 0,0 4 0,-1 3 0,1-2 0,0 3 0,0-4 0,0 4 0,-1-3 0,1 6 0,-3-6 0,2 6 0,-7-5 0,7 5 0,-3-9 0,4 9 0,0-6 0,-1 4 0,1 2 0,-4-6 0,3 6 0,-6-2 0,2 3 0</inkml:trace>
@@ -218,7 +218,7 @@
     <inkml:brush xml:id="br0">
       <inkml:brushProperty name="width" value="0.1" units="cm"/>
       <inkml:brushProperty name="height" value="0.1" units="cm"/>
-      <inkml:brushProperty name="color" value="#004F8B"/>
+      <inkml:brushProperty name="color" value="#347FB5"/>
     </inkml:brush>
   </inkml:definitions>
   <inkml:trace contextRef="#ctx0" brushRef="#br0">1 289 24575,'11'0'0,"4"0"0,-6 0 0,3 0 0,-4 0 0,0 0 0,0 0 0,4 0 0,0 0 0,1 0 0,2 0 0,-6 0 0,3 0 0,-5 0 0,1 0 0,0 0 0,-1 0 0,1 0 0,4 0 0,-3-3 0,3 2 0,-4-3 0,0 4 0,-1 0 0,1-3 0,0 2 0,-1-2 0,1 0 0,4 2 0,-3-6 0,3 6 0,-4-3 0,-1 1 0,1 2 0,0-2 0,0 3 0,-1-4 0,1 4 0,0-4 0,0 1 0,-1-1 0,5-5 0,1 1 0,5 3 0,-5-2 0,-1 6 0,-4-6 0,-1 6 0,1-2 0,0-1 0,0 4 0,-1-7 0,1 2 0,0-3 0,4 4 0,-3-3 0,3 3 0,-5 0 0,1-3 0,0 6 0,-4-6 0,3 3 0,-3-4 0,8 0 0,-3 4 0,3-3 0,-4 2 0,0 1 0,0-3 0,-1 6 0,1-2 0,0-1 0,-1 4 0,1-7 0,0 3 0,-1-4 0,5 0 0,-3 3 0,3-2 0,-4 6 0,-4-6 0,3 7 0,-2-4 0,2 1 0,1 2 0,0-6 0,-1 6 0,1-6 0,0 6 0,-4-6 0,3 7 0,-6-4 0,3 4 0</inkml:trace>
@@ -2835,7 +2835,7 @@
     <inkml:brush xml:id="br0">
       <inkml:brushProperty name="width" value="0.35" units="cm"/>
       <inkml:brushProperty name="height" value="0.35" units="cm"/>
-      <inkml:brushProperty name="color" value="#004F8B"/>
+      <inkml:brushProperty name="color" value="#347FB5"/>
     </inkml:brush>
   </inkml:definitions>
   <inkml:trace contextRef="#ctx0" brushRef="#br0">1 0 24575,'0'0'0</inkml:trace>
@@ -2863,7 +2863,7 @@
     <inkml:brush xml:id="br0">
       <inkml:brushProperty name="width" value="0.35" units="cm"/>
       <inkml:brushProperty name="height" value="0.35" units="cm"/>
-      <inkml:brushProperty name="color" value="#004F8B"/>
+      <inkml:brushProperty name="color" value="#347FB5"/>
     </inkml:brush>
   </inkml:definitions>
   <inkml:trace contextRef="#ctx0" brushRef="#br0">0 1 24575,'0'0'0</inkml:trace>
@@ -2918,7 +2918,7 @@
     <inkml:brush xml:id="br0">
       <inkml:brushProperty name="width" value="0.35" units="cm"/>
       <inkml:brushProperty name="height" value="0.35" units="cm"/>
-      <inkml:brushProperty name="color" value="#004F8B"/>
+      <inkml:brushProperty name="color" value="#347FB5"/>
     </inkml:brush>
   </inkml:definitions>
   <inkml:trace contextRef="#ctx0" brushRef="#br0">0 0 24575,'0'0'0</inkml:trace>
@@ -2946,7 +2946,7 @@
     <inkml:brush xml:id="br0">
       <inkml:brushProperty name="width" value="0.35" units="cm"/>
       <inkml:brushProperty name="height" value="0.35" units="cm"/>
-      <inkml:brushProperty name="color" value="#004F8B"/>
+      <inkml:brushProperty name="color" value="#347FB5"/>
     </inkml:brush>
   </inkml:definitions>
   <inkml:trace contextRef="#ctx0" brushRef="#br0">1 1 24575,'0'0'0</inkml:trace>
@@ -2974,7 +2974,7 @@
     <inkml:brush xml:id="br0">
       <inkml:brushProperty name="width" value="0.35" units="cm"/>
       <inkml:brushProperty name="height" value="0.35" units="cm"/>
-      <inkml:brushProperty name="color" value="#004F8B"/>
+      <inkml:brushProperty name="color" value="#347FB5"/>
     </inkml:brush>
   </inkml:definitions>
   <inkml:trace contextRef="#ctx0" brushRef="#br0">1 0 24575,'0'0'0</inkml:trace>
@@ -3002,7 +3002,7 @@
     <inkml:brush xml:id="br0">
       <inkml:brushProperty name="width" value="0.35" units="cm"/>
       <inkml:brushProperty name="height" value="0.35" units="cm"/>
-      <inkml:brushProperty name="color" value="#004F8B"/>
+      <inkml:brushProperty name="color" value="#347FB5"/>
     </inkml:brush>
   </inkml:definitions>
   <inkml:trace contextRef="#ctx0" brushRef="#br0">1 1 24575,'0'0'0</inkml:trace>
@@ -3030,7 +3030,7 @@
     <inkml:brush xml:id="br0">
       <inkml:brushProperty name="width" value="0.35" units="cm"/>
       <inkml:brushProperty name="height" value="0.35" units="cm"/>
-      <inkml:brushProperty name="color" value="#004F8B"/>
+      <inkml:brushProperty name="color" value="#347FB5"/>
     </inkml:brush>
   </inkml:definitions>
   <inkml:trace contextRef="#ctx0" brushRef="#br0">1 0 24575,'0'0'0</inkml:trace>
@@ -3058,7 +3058,7 @@
     <inkml:brush xml:id="br0">
       <inkml:brushProperty name="width" value="0.35" units="cm"/>
       <inkml:brushProperty name="height" value="0.35" units="cm"/>
-      <inkml:brushProperty name="color" value="#004F8B"/>
+      <inkml:brushProperty name="color" value="#347FB5"/>
     </inkml:brush>
   </inkml:definitions>
   <inkml:trace contextRef="#ctx0" brushRef="#br0">1 1 24575,'0'0'0</inkml:trace>
@@ -3086,7 +3086,7 @@
     <inkml:brush xml:id="br0">
       <inkml:brushProperty name="width" value="0.35" units="cm"/>
       <inkml:brushProperty name="height" value="0.35" units="cm"/>
-      <inkml:brushProperty name="color" value="#004F8B"/>
+      <inkml:brushProperty name="color" value="#347FB5"/>
     </inkml:brush>
   </inkml:definitions>
   <inkml:trace contextRef="#ctx0" brushRef="#br0">1 1 24575,'0'0'0</inkml:trace>
@@ -3114,7 +3114,7 @@
     <inkml:brush xml:id="br0">
       <inkml:brushProperty name="width" value="0.35" units="cm"/>
       <inkml:brushProperty name="height" value="0.35" units="cm"/>
-      <inkml:brushProperty name="color" value="#004F8B"/>
+      <inkml:brushProperty name="color" value="#347FB5"/>
     </inkml:brush>
   </inkml:definitions>
   <inkml:trace contextRef="#ctx0" brushRef="#br0">0 1 24575,'0'0'0</inkml:trace>
@@ -3142,7 +3142,7 @@
     <inkml:brush xml:id="br0">
       <inkml:brushProperty name="width" value="0.1" units="cm"/>
       <inkml:brushProperty name="height" value="0.1" units="cm"/>
-      <inkml:brushProperty name="color" value="#004F8B"/>
+      <inkml:brushProperty name="color" value="#347FB5"/>
     </inkml:brush>
   </inkml:definitions>
   <inkml:trace contextRef="#ctx0" brushRef="#br0">1 160 24575,'16'0'0,"0"0"0,-3 0 0,3 0 0,-4 0 0,1 0 0,-2 0 0,-3 0 0,4 0 0,0 0 0,1 0 0,-2 0 0,1 0 0,-3 0 0,4-7 0,-1 5 0,-3-6 0,3 8 0,-4 0 0,-1 0 0,1 0 0,0 0 0,0-3 0,4 2 0,-3-6 0,7 6 0,-3-6 0,4 6 0,1-7 0,7 7 0,-5-7 0,5 7 0,-7-6 0,-5 6 0,3-7 0,-7 4 0,7-1 0,-3-2 0,4 2 0,1-4 0,-1 4 0,0-2 0,1 2 0,4 0 0,-4-3 0,5 8 0,-6-4 0,0 0 0,-4 3 0,4-3 0,-9 1 0,9 2 0,-9-3 0,8 4 0,-7-3 0,2 2 0,-4-3 0,1 4 0,0 0 0,0 0 0,-1 0 0,0 0 0,-3 0 0,0 0 0</inkml:trace>
@@ -3170,7 +3170,7 @@
     <inkml:brush xml:id="br0">
       <inkml:brushProperty name="width" value="0.1" units="cm"/>
       <inkml:brushProperty name="height" value="0.1" units="cm"/>
-      <inkml:brushProperty name="color" value="#004F8B"/>
+      <inkml:brushProperty name="color" value="#347FB5"/>
     </inkml:brush>
   </inkml:definitions>
   <inkml:trace contextRef="#ctx0" brushRef="#br0">0 827 24575,'0'-11'0,"0"0"0,0 4 0,0-1 0,0 0 0,0 0 0,0-3 0,0 3 0,4-3 0,-3 3 0,10 4 0,-9-8 0,9 11 0,-3-11 0,-2 8 0,5-5 0,-7 5 0,1-3 0,6 2 0,-6-3 0,7 0 0,-4 1 0,4-2 0,-3 1 0,3 0 0,-4 0 0,-1 1 0,5-5 0,-3 6 0,3-5 0,-4 7 0,-3-4 0,1 4 0,-1-3 0,2 3 0,1-8 0,0 3 0,0-3 0,0 4 0,0 0 0,0-4 0,0 3 0,0-3 0,0 5 0,0-1 0,0 0 0,-1 4 0,-2-3 0,2 6 0,-3-6 0,4 3 0,-1-4 0,5 0 0,1-4 0,4-1 0,1-1 0,-1 2 0,-4 3 0,-1 1 0,0 0 0,1-4 0,5-1 0,-1-1 0,0-2 0,0 6 0,6-7 0,-5 3 0,9 0 0,-8-3 0,8 7 0,-8-2 0,3 3 0,-9 0 0,3 1 0,-7 0 0,3 3 0,-4-2 0,0 6 0,-1-2 0,1 0 0,0-2 0,-1 1 0,1-3 0,0 6 0,0-5 0,-1 5 0,-2-6 0,2 6 0,-3-3 0,3 1 0,0-1 0,1-3 0,0-5 0,0 3 0,0 0 0,0 2 0,0 6 0,-4-6 0,3 7 0,-3-10 0,3 5 0,1-2 0,0 0 0,-1 2 0,-2 1 0,-2 1 0</inkml:trace>
@@ -3324,7 +3324,7 @@
           <a:p>
             <a:fld id="{E3A95CAB-516E-DD48-872C-BA867ABD2C8B}" type="datetimeFigureOut">
               <a:rPr lang="en-US" smtClean="0"/>
-              <a:t>10/27/22</a:t>
+              <a:t>12/20/23</a:t>
             </a:fld>
             <a:endParaRPr lang="en-US"/>
           </a:p>
@@ -3522,7 +3522,7 @@
           <a:p>
             <a:fld id="{E3A95CAB-516E-DD48-872C-BA867ABD2C8B}" type="datetimeFigureOut">
               <a:rPr lang="en-US" smtClean="0"/>
-              <a:t>10/27/22</a:t>
+              <a:t>12/20/23</a:t>
             </a:fld>
             <a:endParaRPr lang="en-US"/>
           </a:p>
@@ -3730,7 +3730,7 @@
           <a:p>
             <a:fld id="{E3A95CAB-516E-DD48-872C-BA867ABD2C8B}" type="datetimeFigureOut">
               <a:rPr lang="en-US" smtClean="0"/>
-              <a:t>10/27/22</a:t>
+              <a:t>12/20/23</a:t>
             </a:fld>
             <a:endParaRPr lang="en-US"/>
           </a:p>
@@ -3928,7 +3928,7 @@
           <a:p>
             <a:fld id="{E3A95CAB-516E-DD48-872C-BA867ABD2C8B}" type="datetimeFigureOut">
               <a:rPr lang="en-US" smtClean="0"/>
-              <a:t>10/27/22</a:t>
+              <a:t>12/20/23</a:t>
             </a:fld>
             <a:endParaRPr lang="en-US"/>
           </a:p>
@@ -4203,7 +4203,7 @@
           <a:p>
             <a:fld id="{E3A95CAB-516E-DD48-872C-BA867ABD2C8B}" type="datetimeFigureOut">
               <a:rPr lang="en-US" smtClean="0"/>
-              <a:t>10/27/22</a:t>
+              <a:t>12/20/23</a:t>
             </a:fld>
             <a:endParaRPr lang="en-US"/>
           </a:p>
@@ -4468,7 +4468,7 @@
           <a:p>
             <a:fld id="{E3A95CAB-516E-DD48-872C-BA867ABD2C8B}" type="datetimeFigureOut">
               <a:rPr lang="en-US" smtClean="0"/>
-              <a:t>10/27/22</a:t>
+              <a:t>12/20/23</a:t>
             </a:fld>
             <a:endParaRPr lang="en-US"/>
           </a:p>
@@ -4880,7 +4880,7 @@
           <a:p>
             <a:fld id="{E3A95CAB-516E-DD48-872C-BA867ABD2C8B}" type="datetimeFigureOut">
               <a:rPr lang="en-US" smtClean="0"/>
-              <a:t>10/27/22</a:t>
+              <a:t>12/20/23</a:t>
             </a:fld>
             <a:endParaRPr lang="en-US"/>
           </a:p>
@@ -5021,7 +5021,7 @@
           <a:p>
             <a:fld id="{E3A95CAB-516E-DD48-872C-BA867ABD2C8B}" type="datetimeFigureOut">
               <a:rPr lang="en-US" smtClean="0"/>
-              <a:t>10/27/22</a:t>
+              <a:t>12/20/23</a:t>
             </a:fld>
             <a:endParaRPr lang="en-US"/>
           </a:p>
@@ -5134,7 +5134,7 @@
           <a:p>
             <a:fld id="{E3A95CAB-516E-DD48-872C-BA867ABD2C8B}" type="datetimeFigureOut">
               <a:rPr lang="en-US" smtClean="0"/>
-              <a:t>10/27/22</a:t>
+              <a:t>12/20/23</a:t>
             </a:fld>
             <a:endParaRPr lang="en-US"/>
           </a:p>
@@ -5445,7 +5445,7 @@
           <a:p>
             <a:fld id="{E3A95CAB-516E-DD48-872C-BA867ABD2C8B}" type="datetimeFigureOut">
               <a:rPr lang="en-US" smtClean="0"/>
-              <a:t>10/27/22</a:t>
+              <a:t>12/20/23</a:t>
             </a:fld>
             <a:endParaRPr lang="en-US"/>
           </a:p>
@@ -5733,7 +5733,7 @@
           <a:p>
             <a:fld id="{E3A95CAB-516E-DD48-872C-BA867ABD2C8B}" type="datetimeFigureOut">
               <a:rPr lang="en-US" smtClean="0"/>
-              <a:t>10/27/22</a:t>
+              <a:t>12/20/23</a:t>
             </a:fld>
             <a:endParaRPr lang="en-US"/>
           </a:p>
@@ -5974,7 +5974,7 @@
           <a:p>
             <a:fld id="{E3A95CAB-516E-DD48-872C-BA867ABD2C8B}" type="datetimeFigureOut">
               <a:rPr lang="en-US" smtClean="0"/>
-              <a:t>10/27/22</a:t>
+              <a:t>12/20/23</a:t>
             </a:fld>
             <a:endParaRPr lang="en-US"/>
           </a:p>
@@ -10178,8 +10178,8 @@
         </p:nvSpPr>
         <p:spPr>
           <a:xfrm>
-            <a:off x="1920840" y="3891168"/>
-            <a:ext cx="2618666" cy="369332"/>
+            <a:off x="1816965" y="3891168"/>
+            <a:ext cx="2826416" cy="369332"/>
           </a:xfrm>
           <a:prstGeom prst="rect">
             <a:avLst/>
@@ -10194,7 +10194,10 @@
           <a:p>
             <a:pPr algn="ctr"/>
             <a:r>
-              <a:rPr lang="en-US" b="1" dirty="0"/>
+              <a:rPr lang="en-US" b="1" dirty="0">
+                <a:latin typeface="Source Sans Pro" panose="020B0503030403020204" pitchFamily="34" charset="0"/>
+                <a:ea typeface="Source Sans Pro" panose="020B0503030403020204" pitchFamily="34" charset="0"/>
+              </a:rPr>
               <a:t>Discrete, two-level design</a:t>
             </a:r>
           </a:p>
@@ -10724,8 +10727,8 @@
         </p:nvSpPr>
         <p:spPr>
           <a:xfrm>
-            <a:off x="4742522" y="3896229"/>
-            <a:ext cx="2759089" cy="369332"/>
+            <a:off x="4631113" y="3896229"/>
+            <a:ext cx="2981907" cy="369332"/>
           </a:xfrm>
           <a:prstGeom prst="rect">
             <a:avLst/>
@@ -10740,7 +10743,10 @@
           <a:p>
             <a:pPr algn="ctr"/>
             <a:r>
-              <a:rPr lang="en-US" b="1" dirty="0"/>
+              <a:rPr lang="en-US" b="1" dirty="0">
+                <a:latin typeface="Source Sans Pro" panose="020B0503030403020204" pitchFamily="34" charset="0"/>
+                <a:ea typeface="Source Sans Pro" panose="020B0503030403020204" pitchFamily="34" charset="0"/>
+              </a:rPr>
               <a:t>Discrete, three-level design</a:t>
             </a:r>
           </a:p>
@@ -10760,8 +10766,8 @@
         </p:nvSpPr>
         <p:spPr>
           <a:xfrm>
-            <a:off x="7854169" y="3891168"/>
-            <a:ext cx="1944251" cy="369332"/>
+            <a:off x="7787388" y="3891168"/>
+            <a:ext cx="2077813" cy="369332"/>
           </a:xfrm>
           <a:prstGeom prst="rect">
             <a:avLst/>
@@ -10776,7 +10782,10 @@
           <a:p>
             <a:pPr algn="ctr"/>
             <a:r>
-              <a:rPr lang="en-US" b="1" dirty="0"/>
+              <a:rPr lang="en-US" b="1" dirty="0">
+                <a:latin typeface="Source Sans Pro" panose="020B0503030403020204" pitchFamily="34" charset="0"/>
+                <a:ea typeface="Source Sans Pro" panose="020B0503030403020204" pitchFamily="34" charset="0"/>
+              </a:rPr>
               <a:t>Continuous design</a:t>
             </a:r>
           </a:p>
@@ -11241,8 +11250,8 @@
           </p:pic>
         </mc:Fallback>
       </mc:AlternateContent>
-      <mc:AlternateContent xmlns:mc="http://schemas.openxmlformats.org/markup-compatibility/2006" xmlns:p14="http://schemas.microsoft.com/office/powerpoint/2010/main">
-        <mc:Choice Requires="p14">
+      <mc:AlternateContent xmlns:mc="http://schemas.openxmlformats.org/markup-compatibility/2006">
+        <mc:Choice xmlns:p14="http://schemas.microsoft.com/office/powerpoint/2010/main" Requires="p14">
           <p:contentPart p14:bwMode="auto" r:id="rId142">
             <p14:nvContentPartPr>
               <p14:cNvPr id="55" name="Ink 54">
@@ -11261,7 +11270,7 @@
             </p14:xfrm>
           </p:contentPart>
         </mc:Choice>
-        <mc:Fallback xmlns="">
+        <mc:Fallback>
           <p:pic>
             <p:nvPicPr>
               <p:cNvPr id="55" name="Ink 54">
@@ -11282,7 +11291,7 @@
             </p:blipFill>
             <p:spPr>
               <a:xfrm>
-                <a:off x="2478514" y="5296371"/>
+                <a:off x="2478154" y="5296371"/>
                 <a:ext cx="126000" cy="126000"/>
               </a:xfrm>
               <a:prstGeom prst="rect">
@@ -11292,8 +11301,8 @@
           </p:pic>
         </mc:Fallback>
       </mc:AlternateContent>
-      <mc:AlternateContent xmlns:mc="http://schemas.openxmlformats.org/markup-compatibility/2006" xmlns:p14="http://schemas.microsoft.com/office/powerpoint/2010/main">
-        <mc:Choice Requires="p14">
+      <mc:AlternateContent xmlns:mc="http://schemas.openxmlformats.org/markup-compatibility/2006">
+        <mc:Choice xmlns:p14="http://schemas.microsoft.com/office/powerpoint/2010/main" Requires="p14">
           <p:contentPart p14:bwMode="auto" r:id="rId144">
             <p14:nvContentPartPr>
               <p14:cNvPr id="56" name="Ink 55">
@@ -11312,7 +11321,7 @@
             </p14:xfrm>
           </p:contentPart>
         </mc:Choice>
-        <mc:Fallback xmlns="">
+        <mc:Fallback>
           <p:pic>
             <p:nvPicPr>
               <p:cNvPr id="56" name="Ink 55">
@@ -11333,7 +11342,7 @@
             </p:blipFill>
             <p:spPr>
               <a:xfrm>
-                <a:off x="5355634" y="5294571"/>
+                <a:off x="5355634" y="5294211"/>
                 <a:ext cx="126000" cy="126000"/>
               </a:xfrm>
               <a:prstGeom prst="rect">
@@ -11343,8 +11352,8 @@
           </p:pic>
         </mc:Fallback>
       </mc:AlternateContent>
-      <mc:AlternateContent xmlns:mc="http://schemas.openxmlformats.org/markup-compatibility/2006" xmlns:p14="http://schemas.microsoft.com/office/powerpoint/2010/main">
-        <mc:Choice Requires="p14">
+      <mc:AlternateContent xmlns:mc="http://schemas.openxmlformats.org/markup-compatibility/2006">
+        <mc:Choice xmlns:p14="http://schemas.microsoft.com/office/powerpoint/2010/main" Requires="p14">
           <p:contentPart p14:bwMode="auto" r:id="rId145">
             <p14:nvContentPartPr>
               <p14:cNvPr id="57" name="Ink 56">
@@ -11363,7 +11372,7 @@
             </p14:xfrm>
           </p:contentPart>
         </mc:Choice>
-        <mc:Fallback xmlns="">
+        <mc:Fallback>
           <p:pic>
             <p:nvPicPr>
               <p:cNvPr id="57" name="Ink 56">
@@ -11394,8 +11403,8 @@
           </p:pic>
         </mc:Fallback>
       </mc:AlternateContent>
-      <mc:AlternateContent xmlns:mc="http://schemas.openxmlformats.org/markup-compatibility/2006" xmlns:p14="http://schemas.microsoft.com/office/powerpoint/2010/main">
-        <mc:Choice Requires="p14">
+      <mc:AlternateContent xmlns:mc="http://schemas.openxmlformats.org/markup-compatibility/2006">
+        <mc:Choice xmlns:p14="http://schemas.microsoft.com/office/powerpoint/2010/main" Requires="p14">
           <p:contentPart p14:bwMode="auto" r:id="rId146">
             <p14:nvContentPartPr>
               <p14:cNvPr id="58" name="Ink 57">
@@ -11414,7 +11423,7 @@
             </p14:xfrm>
           </p:contentPart>
         </mc:Choice>
-        <mc:Fallback xmlns="">
+        <mc:Fallback>
           <p:pic>
             <p:nvPicPr>
               <p:cNvPr id="58" name="Ink 57">
@@ -11435,7 +11444,7 @@
             </p:blipFill>
             <p:spPr>
               <a:xfrm>
-                <a:off x="6792394" y="4460811"/>
+                <a:off x="6792034" y="4460451"/>
                 <a:ext cx="126000" cy="126000"/>
               </a:xfrm>
               <a:prstGeom prst="rect">
@@ -11445,8 +11454,8 @@
           </p:pic>
         </mc:Fallback>
       </mc:AlternateContent>
-      <mc:AlternateContent xmlns:mc="http://schemas.openxmlformats.org/markup-compatibility/2006" xmlns:p14="http://schemas.microsoft.com/office/powerpoint/2010/main">
-        <mc:Choice Requires="p14">
+      <mc:AlternateContent xmlns:mc="http://schemas.openxmlformats.org/markup-compatibility/2006">
+        <mc:Choice xmlns:p14="http://schemas.microsoft.com/office/powerpoint/2010/main" Requires="p14">
           <p:contentPart p14:bwMode="auto" r:id="rId147">
             <p14:nvContentPartPr>
               <p14:cNvPr id="59" name="Ink 58">
@@ -11465,7 +11474,7 @@
             </p14:xfrm>
           </p:contentPart>
         </mc:Choice>
-        <mc:Fallback xmlns="">
+        <mc:Fallback>
           <p:pic>
             <p:nvPicPr>
               <p:cNvPr id="59" name="Ink 58">
@@ -11486,7 +11495,7 @@
             </p:blipFill>
             <p:spPr>
               <a:xfrm>
-                <a:off x="8035474" y="5279091"/>
+                <a:off x="8035114" y="5279091"/>
                 <a:ext cx="126000" cy="126000"/>
               </a:xfrm>
               <a:prstGeom prst="rect">
@@ -11496,8 +11505,8 @@
           </p:pic>
         </mc:Fallback>
       </mc:AlternateContent>
-      <mc:AlternateContent xmlns:mc="http://schemas.openxmlformats.org/markup-compatibility/2006" xmlns:p14="http://schemas.microsoft.com/office/powerpoint/2010/main">
-        <mc:Choice Requires="p14">
+      <mc:AlternateContent xmlns:mc="http://schemas.openxmlformats.org/markup-compatibility/2006">
+        <mc:Choice xmlns:p14="http://schemas.microsoft.com/office/powerpoint/2010/main" Requires="p14">
           <p:contentPart p14:bwMode="auto" r:id="rId148">
             <p14:nvContentPartPr>
               <p14:cNvPr id="60" name="Ink 59">
@@ -11516,7 +11525,7 @@
             </p14:xfrm>
           </p:contentPart>
         </mc:Choice>
-        <mc:Fallback xmlns="">
+        <mc:Fallback>
           <p:pic>
             <p:nvPicPr>
               <p:cNvPr id="60" name="Ink 59">
@@ -11537,7 +11546,7 @@
             </p:blipFill>
             <p:spPr>
               <a:xfrm>
-                <a:off x="8463154" y="5169275"/>
+                <a:off x="8462794" y="5168915"/>
                 <a:ext cx="126000" cy="126000"/>
               </a:xfrm>
               <a:prstGeom prst="rect">
@@ -11547,8 +11556,8 @@
           </p:pic>
         </mc:Fallback>
       </mc:AlternateContent>
-      <mc:AlternateContent xmlns:mc="http://schemas.openxmlformats.org/markup-compatibility/2006" xmlns:p14="http://schemas.microsoft.com/office/powerpoint/2010/main">
-        <mc:Choice Requires="p14">
+      <mc:AlternateContent xmlns:mc="http://schemas.openxmlformats.org/markup-compatibility/2006">
+        <mc:Choice xmlns:p14="http://schemas.microsoft.com/office/powerpoint/2010/main" Requires="p14">
           <p:contentPart p14:bwMode="auto" r:id="rId149">
             <p14:nvContentPartPr>
               <p14:cNvPr id="67" name="Ink 66">
@@ -11567,7 +11576,7 @@
             </p14:xfrm>
           </p:contentPart>
         </mc:Choice>
-        <mc:Fallback xmlns="">
+        <mc:Fallback>
           <p:pic>
             <p:nvPicPr>
               <p:cNvPr id="67" name="Ink 66">
@@ -11588,7 +11597,7 @@
             </p:blipFill>
             <p:spPr>
               <a:xfrm>
-                <a:off x="3907946" y="4697657"/>
+                <a:off x="3907586" y="4697657"/>
                 <a:ext cx="126000" cy="126000"/>
               </a:xfrm>
               <a:prstGeom prst="rect">
@@ -11613,7 +11622,7 @@
         <p:spPr>
           <a:xfrm>
             <a:off x="2068379" y="5780793"/>
-            <a:ext cx="877741" cy="369332"/>
+            <a:ext cx="910827" cy="369332"/>
           </a:xfrm>
           <a:prstGeom prst="rect">
             <a:avLst/>
@@ -11627,7 +11636,10 @@
           <a:lstStyle/>
           <a:p>
             <a:r>
-              <a:rPr lang="en-US" dirty="0"/>
+              <a:rPr lang="en-US" dirty="0">
+                <a:latin typeface="Source Sans Pro" panose="020B0503030403020204" pitchFamily="34" charset="0"/>
+                <a:ea typeface="Source Sans Pro" panose="020B0503030403020204" pitchFamily="34" charset="0"/>
+              </a:rPr>
               <a:t>Control</a:t>
             </a:r>
           </a:p>
@@ -11648,7 +11660,7 @@
         <p:spPr>
           <a:xfrm>
             <a:off x="3382523" y="5780793"/>
-            <a:ext cx="1156983" cy="369332"/>
+            <a:ext cx="1207382" cy="369332"/>
           </a:xfrm>
           <a:prstGeom prst="rect">
             <a:avLst/>
@@ -11662,7 +11674,10 @@
           <a:lstStyle/>
           <a:p>
             <a:r>
-              <a:rPr lang="en-US" dirty="0"/>
+              <a:rPr lang="en-US" dirty="0">
+                <a:latin typeface="Source Sans Pro" panose="020B0503030403020204" pitchFamily="34" charset="0"/>
+                <a:ea typeface="Source Sans Pro" panose="020B0503030403020204" pitchFamily="34" charset="0"/>
+              </a:rPr>
               <a:t>Treatment</a:t>
             </a:r>
           </a:p>
@@ -11697,7 +11712,10 @@
           <a:lstStyle/>
           <a:p>
             <a:r>
-              <a:rPr lang="en-US" dirty="0"/>
+              <a:rPr lang="en-US" dirty="0">
+                <a:latin typeface="Source Sans Pro" panose="020B0503030403020204" pitchFamily="34" charset="0"/>
+                <a:ea typeface="Source Sans Pro" panose="020B0503030403020204" pitchFamily="34" charset="0"/>
+              </a:rPr>
               <a:t>Control      T1          T2</a:t>
             </a:r>
           </a:p>
@@ -11718,7 +11736,7 @@
         <p:spPr>
           <a:xfrm>
             <a:off x="8027592" y="6127041"/>
-            <a:ext cx="1876411" cy="369332"/>
+            <a:ext cx="1951175" cy="369332"/>
           </a:xfrm>
           <a:prstGeom prst="rect">
             <a:avLst/>
@@ -11732,7 +11750,10 @@
           <a:lstStyle/>
           <a:p>
             <a:r>
-              <a:rPr lang="en-US" dirty="0"/>
+              <a:rPr lang="en-US" dirty="0">
+                <a:latin typeface="Source Sans Pro" panose="020B0503030403020204" pitchFamily="34" charset="0"/>
+                <a:ea typeface="Source Sans Pro" panose="020B0503030403020204" pitchFamily="34" charset="0"/>
+              </a:rPr>
               <a:t>Treatment dosage</a:t>
             </a:r>
           </a:p>
@@ -11753,7 +11774,7 @@
         <p:spPr>
           <a:xfrm>
             <a:off x="7791522" y="5780793"/>
-            <a:ext cx="2145139" cy="369332"/>
+            <a:ext cx="1970411" cy="369332"/>
           </a:xfrm>
           <a:prstGeom prst="rect">
             <a:avLst/>
@@ -11767,7 +11788,10 @@
           <a:lstStyle/>
           <a:p>
             <a:r>
-              <a:rPr lang="en-US" dirty="0"/>
+              <a:rPr lang="en-US" dirty="0">
+                <a:latin typeface="Source Sans Pro" panose="020B0503030403020204" pitchFamily="34" charset="0"/>
+                <a:ea typeface="Source Sans Pro" panose="020B0503030403020204" pitchFamily="34" charset="0"/>
+              </a:rPr>
               <a:t>   0      1      2      3     4</a:t>
             </a:r>
           </a:p>
@@ -11787,8 +11811,8 @@
         </p:nvSpPr>
         <p:spPr>
           <a:xfrm>
-            <a:off x="5580622" y="6127041"/>
-            <a:ext cx="1099981" cy="369332"/>
+            <a:off x="5561386" y="6127041"/>
+            <a:ext cx="1138453" cy="369332"/>
           </a:xfrm>
           <a:prstGeom prst="rect">
             <a:avLst/>
@@ -11803,7 +11827,10 @@
           <a:p>
             <a:pPr algn="ctr"/>
             <a:r>
-              <a:rPr lang="en-US" dirty="0"/>
+              <a:rPr lang="en-US" dirty="0">
+                <a:latin typeface="Source Sans Pro" panose="020B0503030403020204" pitchFamily="34" charset="0"/>
+                <a:ea typeface="Source Sans Pro" panose="020B0503030403020204" pitchFamily="34" charset="0"/>
+              </a:rPr>
               <a:t>Condition</a:t>
             </a:r>
           </a:p>
@@ -11823,8 +11850,8 @@
         </p:nvSpPr>
         <p:spPr>
           <a:xfrm rot="16200000">
-            <a:off x="965566" y="4716425"/>
-            <a:ext cx="1050352" cy="369332"/>
+            <a:off x="951973" y="4716425"/>
+            <a:ext cx="1077539" cy="369332"/>
           </a:xfrm>
           <a:prstGeom prst="rect">
             <a:avLst/>
@@ -11839,7 +11866,10 @@
           <a:p>
             <a:pPr algn="ctr"/>
             <a:r>
-              <a:rPr lang="en-US" dirty="0"/>
+              <a:rPr lang="en-US" dirty="0">
+                <a:latin typeface="Source Sans Pro" panose="020B0503030403020204" pitchFamily="34" charset="0"/>
+                <a:ea typeface="Source Sans Pro" panose="020B0503030403020204" pitchFamily="34" charset="0"/>
+              </a:rPr>
               <a:t>Outcome</a:t>
             </a:r>
           </a:p>
@@ -11859,8 +11889,8 @@
         </p:nvSpPr>
         <p:spPr>
           <a:xfrm rot="16200000">
-            <a:off x="1162634" y="4728705"/>
-            <a:ext cx="1265091" cy="369332"/>
+            <a:off x="1215533" y="4728705"/>
+            <a:ext cx="1159292" cy="369332"/>
           </a:xfrm>
           <a:prstGeom prst="rect">
             <a:avLst/>
@@ -11875,7 +11905,10 @@
           <a:p>
             <a:pPr algn="ctr"/>
             <a:r>
-              <a:rPr lang="en-US" dirty="0"/>
+              <a:rPr lang="en-US" dirty="0">
+                <a:latin typeface="Source Sans Pro" panose="020B0503030403020204" pitchFamily="34" charset="0"/>
+                <a:ea typeface="Source Sans Pro" panose="020B0503030403020204" pitchFamily="34" charset="0"/>
+              </a:rPr>
               <a:t>0                1</a:t>
             </a:r>
           </a:p>
@@ -11895,8 +11928,8 @@
         </p:nvSpPr>
         <p:spPr>
           <a:xfrm>
-            <a:off x="2680182" y="6127041"/>
-            <a:ext cx="1099981" cy="369332"/>
+            <a:off x="2660946" y="6127041"/>
+            <a:ext cx="1138453" cy="369332"/>
           </a:xfrm>
           <a:prstGeom prst="rect">
             <a:avLst/>
@@ -11911,7 +11944,10 @@
           <a:p>
             <a:pPr algn="ctr"/>
             <a:r>
-              <a:rPr lang="en-US" dirty="0"/>
+              <a:rPr lang="en-US" dirty="0">
+                <a:latin typeface="Source Sans Pro" panose="020B0503030403020204" pitchFamily="34" charset="0"/>
+                <a:ea typeface="Source Sans Pro" panose="020B0503030403020204" pitchFamily="34" charset="0"/>
+              </a:rPr>
               <a:t>Condition</a:t>
             </a:r>
           </a:p>
@@ -11971,7 +12007,7 @@
                 <p:nvPr/>
               </p:nvPicPr>
               <p:blipFill>
-                <a:blip r:embed="rId143"/>
+                <a:blip r:embed="rId151"/>
                 <a:stretch>
                   <a:fillRect/>
                 </a:stretch>
@@ -11990,7 +12026,7 @@
         </mc:AlternateContent>
         <mc:AlternateContent xmlns:mc="http://schemas.openxmlformats.org/markup-compatibility/2006" xmlns:p14="http://schemas.microsoft.com/office/powerpoint/2010/main">
           <mc:Choice Requires="p14">
-            <p:contentPart p14:bwMode="auto" r:id="rId151">
+            <p:contentPart p14:bwMode="auto" r:id="rId152">
               <p14:nvContentPartPr>
                 <p14:cNvPr id="61" name="Ink 60">
                   <a:extLst>
@@ -12022,7 +12058,7 @@
                 <p:nvPr/>
               </p:nvPicPr>
               <p:blipFill>
-                <a:blip r:embed="rId143"/>
+                <a:blip r:embed="rId151"/>
                 <a:stretch>
                   <a:fillRect/>
                 </a:stretch>
@@ -12041,7 +12077,7 @@
         </mc:AlternateContent>
         <mc:AlternateContent xmlns:mc="http://schemas.openxmlformats.org/markup-compatibility/2006" xmlns:p14="http://schemas.microsoft.com/office/powerpoint/2010/main">
           <mc:Choice Requires="p14">
-            <p:contentPart p14:bwMode="auto" r:id="rId152">
+            <p:contentPart p14:bwMode="auto" r:id="rId153">
               <p14:nvContentPartPr>
                 <p14:cNvPr id="62" name="Ink 61">
                   <a:extLst>
@@ -12073,7 +12109,7 @@
                 <p:nvPr/>
               </p:nvPicPr>
               <p:blipFill>
-                <a:blip r:embed="rId143"/>
+                <a:blip r:embed="rId151"/>
                 <a:stretch>
                   <a:fillRect/>
                 </a:stretch>
@@ -12092,7 +12128,7 @@
         </mc:AlternateContent>
         <mc:AlternateContent xmlns:mc="http://schemas.openxmlformats.org/markup-compatibility/2006" xmlns:p14="http://schemas.microsoft.com/office/powerpoint/2010/main">
           <mc:Choice Requires="p14">
-            <p:contentPart p14:bwMode="auto" r:id="rId153">
+            <p:contentPart p14:bwMode="auto" r:id="rId154">
               <p14:nvContentPartPr>
                 <p14:cNvPr id="97" name="Ink 96">
                   <a:extLst>
@@ -12124,7 +12160,7 @@
                 <p:nvPr/>
               </p:nvPicPr>
               <p:blipFill>
-                <a:blip r:embed="rId154"/>
+                <a:blip r:embed="rId155"/>
                 <a:stretch>
                   <a:fillRect/>
                 </a:stretch>
@@ -12143,7 +12179,7 @@
         </mc:AlternateContent>
         <mc:AlternateContent xmlns:mc="http://schemas.openxmlformats.org/markup-compatibility/2006" xmlns:p14="http://schemas.microsoft.com/office/powerpoint/2010/main">
           <mc:Choice Requires="p14">
-            <p:contentPart p14:bwMode="auto" r:id="rId155">
+            <p:contentPart p14:bwMode="auto" r:id="rId156">
               <p14:nvContentPartPr>
                 <p14:cNvPr id="98" name="Ink 97">
                   <a:extLst>
@@ -12175,7 +12211,7 @@
                 <p:nvPr/>
               </p:nvPicPr>
               <p:blipFill>
-                <a:blip r:embed="rId156"/>
+                <a:blip r:embed="rId157"/>
                 <a:stretch>
                   <a:fillRect/>
                 </a:stretch>
@@ -12194,7 +12230,7 @@
         </mc:AlternateContent>
         <mc:AlternateContent xmlns:mc="http://schemas.openxmlformats.org/markup-compatibility/2006" xmlns:p14="http://schemas.microsoft.com/office/powerpoint/2010/main">
           <mc:Choice Requires="p14">
-            <p:contentPart p14:bwMode="auto" r:id="rId157">
+            <p:contentPart p14:bwMode="auto" r:id="rId158">
               <p14:nvContentPartPr>
                 <p14:cNvPr id="100" name="Ink 99">
                   <a:extLst>
@@ -12226,7 +12262,7 @@
                 <p:nvPr/>
               </p:nvPicPr>
               <p:blipFill>
-                <a:blip r:embed="rId158"/>
+                <a:blip r:embed="rId159"/>
                 <a:stretch>
                   <a:fillRect/>
                 </a:stretch>
@@ -12245,7 +12281,7 @@
         </mc:AlternateContent>
         <mc:AlternateContent xmlns:mc="http://schemas.openxmlformats.org/markup-compatibility/2006" xmlns:p14="http://schemas.microsoft.com/office/powerpoint/2010/main">
           <mc:Choice Requires="p14">
-            <p:contentPart p14:bwMode="auto" r:id="rId159">
+            <p:contentPart p14:bwMode="auto" r:id="rId160">
               <p14:nvContentPartPr>
                 <p14:cNvPr id="102" name="Ink 101">
                   <a:extLst>
@@ -12277,7 +12313,7 @@
                 <p:nvPr/>
               </p:nvPicPr>
               <p:blipFill>
-                <a:blip r:embed="rId160"/>
+                <a:blip r:embed="rId161"/>
                 <a:stretch>
                   <a:fillRect/>
                 </a:stretch>
@@ -12574,7 +12610,7 @@
         <p:spPr>
           <a:xfrm>
             <a:off x="7130144" y="1418660"/>
-            <a:ext cx="1009572" cy="369332"/>
+            <a:ext cx="1037463" cy="369332"/>
           </a:xfrm>
           <a:prstGeom prst="rect">
             <a:avLst/>
@@ -12588,7 +12624,10 @@
           <a:lstStyle/>
           <a:p>
             <a:r>
-              <a:rPr lang="en-US" dirty="0"/>
+              <a:rPr lang="en-US" dirty="0">
+                <a:latin typeface="Source Sans Pro" panose="020B0503030403020204" pitchFamily="34" charset="0"/>
+                <a:ea typeface="Source Sans Pro" panose="020B0503030403020204" pitchFamily="34" charset="0"/>
+              </a:rPr>
               <a:t>Negative</a:t>
             </a:r>
           </a:p>
@@ -12609,7 +12648,7 @@
         <p:spPr>
           <a:xfrm>
             <a:off x="8665030" y="1418660"/>
-            <a:ext cx="886846" cy="369332"/>
+            <a:ext cx="907621" cy="369332"/>
           </a:xfrm>
           <a:prstGeom prst="rect">
             <a:avLst/>
@@ -12623,7 +12662,10 @@
           <a:lstStyle/>
           <a:p>
             <a:r>
-              <a:rPr lang="en-US" dirty="0"/>
+              <a:rPr lang="en-US" dirty="0">
+                <a:latin typeface="Source Sans Pro" panose="020B0503030403020204" pitchFamily="34" charset="0"/>
+                <a:ea typeface="Source Sans Pro" panose="020B0503030403020204" pitchFamily="34" charset="0"/>
+              </a:rPr>
               <a:t>Neutral</a:t>
             </a:r>
           </a:p>
@@ -12644,7 +12686,7 @@
         <p:spPr>
           <a:xfrm>
             <a:off x="7904334" y="1087131"/>
-            <a:ext cx="1062150" cy="369332"/>
+            <a:ext cx="1114408" cy="369332"/>
           </a:xfrm>
           <a:prstGeom prst="rect">
             <a:avLst/>
@@ -12658,7 +12700,10 @@
           <a:lstStyle/>
           <a:p>
             <a:r>
-              <a:rPr lang="en-US" b="1" dirty="0"/>
+              <a:rPr lang="en-US" b="1" dirty="0">
+                <a:latin typeface="Source Sans Pro" panose="020B0503030403020204" pitchFamily="34" charset="0"/>
+                <a:ea typeface="Source Sans Pro" panose="020B0503030403020204" pitchFamily="34" charset="0"/>
+              </a:rPr>
               <a:t>Outcome</a:t>
             </a:r>
           </a:p>
@@ -12678,10 +12723,10 @@
         </p:nvGrpSpPr>
         <p:grpSpPr>
           <a:xfrm rot="16200000">
-            <a:off x="5530330" y="3353368"/>
-            <a:ext cx="1584428" cy="722095"/>
-            <a:chOff x="7368192" y="1239531"/>
-            <a:chExt cx="1584428" cy="722095"/>
+            <a:off x="5514301" y="3347726"/>
+            <a:ext cx="1616489" cy="722096"/>
+            <a:chOff x="7357804" y="1239531"/>
+            <a:chExt cx="1616489" cy="722096"/>
           </a:xfrm>
         </p:grpSpPr>
         <p:sp>
@@ -12698,8 +12743,8 @@
           </p:nvSpPr>
           <p:spPr>
             <a:xfrm>
-              <a:off x="7368192" y="1592294"/>
-              <a:ext cx="886846" cy="369332"/>
+              <a:off x="7357804" y="1592295"/>
+              <a:ext cx="907621" cy="369332"/>
             </a:xfrm>
             <a:prstGeom prst="rect">
               <a:avLst/>
@@ -12713,7 +12758,10 @@
             <a:lstStyle/>
             <a:p>
               <a:r>
-                <a:rPr lang="en-US" dirty="0"/>
+                <a:rPr lang="en-US" dirty="0">
+                  <a:latin typeface="Source Sans Pro" panose="020B0503030403020204" pitchFamily="34" charset="0"/>
+                  <a:ea typeface="Source Sans Pro" panose="020B0503030403020204" pitchFamily="34" charset="0"/>
+                </a:rPr>
                 <a:t>Neutral</a:t>
               </a:r>
             </a:p>
@@ -12733,8 +12781,8 @@
           </p:nvSpPr>
           <p:spPr>
             <a:xfrm>
-              <a:off x="8222997" y="1239531"/>
-              <a:ext cx="729623" cy="369332"/>
+              <a:off x="8201324" y="1239531"/>
+              <a:ext cx="772969" cy="369332"/>
             </a:xfrm>
             <a:prstGeom prst="rect">
               <a:avLst/>
@@ -12748,7 +12796,10 @@
             <a:lstStyle/>
             <a:p>
               <a:r>
-                <a:rPr lang="en-US" b="1" dirty="0"/>
+                <a:rPr lang="en-US" b="1" dirty="0">
+                  <a:latin typeface="Source Sans Pro" panose="020B0503030403020204" pitchFamily="34" charset="0"/>
+                  <a:ea typeface="Source Sans Pro" panose="020B0503030403020204" pitchFamily="34" charset="0"/>
+                </a:rPr>
                 <a:t>Belief</a:t>
               </a:r>
             </a:p>
@@ -12769,8 +12820,8 @@
         </p:nvSpPr>
         <p:spPr>
           <a:xfrm rot="16200000">
-            <a:off x="5993142" y="2444616"/>
-            <a:ext cx="1009572" cy="369332"/>
+            <a:off x="5979197" y="2444616"/>
+            <a:ext cx="1037463" cy="369332"/>
           </a:xfrm>
           <a:prstGeom prst="rect">
             <a:avLst/>
@@ -12784,7 +12835,10 @@
           <a:lstStyle/>
           <a:p>
             <a:r>
-              <a:rPr lang="en-US" dirty="0"/>
+              <a:rPr lang="en-US" dirty="0">
+                <a:latin typeface="Source Sans Pro" panose="020B0503030403020204" pitchFamily="34" charset="0"/>
+                <a:ea typeface="Source Sans Pro" panose="020B0503030403020204" pitchFamily="34" charset="0"/>
+              </a:rPr>
               <a:t>Negative</a:t>
             </a:r>
           </a:p>
@@ -12805,7 +12859,7 @@
         <p:spPr>
           <a:xfrm>
             <a:off x="6857194" y="2090672"/>
-            <a:ext cx="1533646" cy="1077218"/>
+            <a:ext cx="1533646" cy="1015663"/>
           </a:xfrm>
           <a:prstGeom prst="rect">
             <a:avLst/>
@@ -12820,31 +12874,52 @@
           <a:p>
             <a:pPr algn="ctr"/>
             <a:r>
-              <a:rPr lang="en-US" sz="1600" dirty="0"/>
+              <a:rPr lang="en-US" sz="1500" dirty="0">
+                <a:latin typeface="Source Sans Pro" panose="020B0503030403020204" pitchFamily="34" charset="0"/>
+                <a:ea typeface="Source Sans Pro" panose="020B0503030403020204" pitchFamily="34" charset="0"/>
+              </a:rPr>
               <a:t>Grace thinks the powder is </a:t>
             </a:r>
             <a:r>
-              <a:rPr lang="en-US" sz="1600" b="1" dirty="0"/>
+              <a:rPr lang="en-US" sz="1500" b="1" dirty="0">
+                <a:latin typeface="Source Sans Pro" panose="020B0503030403020204" pitchFamily="34" charset="0"/>
+                <a:ea typeface="Source Sans Pro" panose="020B0503030403020204" pitchFamily="34" charset="0"/>
+              </a:rPr>
               <a:t>toxic</a:t>
             </a:r>
             <a:r>
-              <a:rPr lang="en-US" sz="1600" dirty="0"/>
+              <a:rPr lang="en-US" sz="1500" dirty="0">
+                <a:latin typeface="Source Sans Pro" panose="020B0503030403020204" pitchFamily="34" charset="0"/>
+                <a:ea typeface="Source Sans Pro" panose="020B0503030403020204" pitchFamily="34" charset="0"/>
+              </a:rPr>
               <a:t>. It is </a:t>
             </a:r>
             <a:r>
-              <a:rPr lang="en-US" sz="1600" b="1" dirty="0"/>
+              <a:rPr lang="en-US" sz="1500" b="1" dirty="0">
+                <a:latin typeface="Source Sans Pro" panose="020B0503030403020204" pitchFamily="34" charset="0"/>
+                <a:ea typeface="Source Sans Pro" panose="020B0503030403020204" pitchFamily="34" charset="0"/>
+              </a:rPr>
               <a:t>toxic</a:t>
             </a:r>
             <a:r>
-              <a:rPr lang="en-US" sz="1600" dirty="0"/>
+              <a:rPr lang="en-US" sz="1500" dirty="0">
+                <a:latin typeface="Source Sans Pro" panose="020B0503030403020204" pitchFamily="34" charset="0"/>
+                <a:ea typeface="Source Sans Pro" panose="020B0503030403020204" pitchFamily="34" charset="0"/>
+              </a:rPr>
               <a:t>. Her friend </a:t>
             </a:r>
             <a:r>
-              <a:rPr lang="en-US" sz="1600" b="1" dirty="0"/>
+              <a:rPr lang="en-US" sz="1500" b="1" dirty="0">
+                <a:latin typeface="Source Sans Pro" panose="020B0503030403020204" pitchFamily="34" charset="0"/>
+                <a:ea typeface="Source Sans Pro" panose="020B0503030403020204" pitchFamily="34" charset="0"/>
+              </a:rPr>
               <a:t>dies</a:t>
             </a:r>
             <a:r>
-              <a:rPr lang="en-US" sz="1600" dirty="0"/>
+              <a:rPr lang="en-US" sz="1500" dirty="0">
+                <a:latin typeface="Source Sans Pro" panose="020B0503030403020204" pitchFamily="34" charset="0"/>
+                <a:ea typeface="Source Sans Pro" panose="020B0503030403020204" pitchFamily="34" charset="0"/>
+              </a:rPr>
               <a:t>.</a:t>
             </a:r>
           </a:p>
@@ -12865,7 +12940,7 @@
         <p:spPr>
           <a:xfrm>
             <a:off x="6826681" y="3484623"/>
-            <a:ext cx="1587489" cy="1077218"/>
+            <a:ext cx="1587489" cy="1015663"/>
           </a:xfrm>
           <a:prstGeom prst="rect">
             <a:avLst/>
@@ -12880,31 +12955,52 @@
           <a:p>
             <a:pPr algn="ctr"/>
             <a:r>
-              <a:rPr lang="en-US" sz="1600" dirty="0"/>
+              <a:rPr lang="en-US" sz="1500" dirty="0">
+                <a:latin typeface="Source Sans Pro" panose="020B0503030403020204" pitchFamily="34" charset="0"/>
+                <a:ea typeface="Source Sans Pro" panose="020B0503030403020204" pitchFamily="34" charset="0"/>
+              </a:rPr>
               <a:t>Grace thinks the powder is </a:t>
             </a:r>
             <a:r>
-              <a:rPr lang="en-US" sz="1600" b="1" dirty="0"/>
+              <a:rPr lang="en-US" sz="1500" b="1" dirty="0">
+                <a:latin typeface="Source Sans Pro" panose="020B0503030403020204" pitchFamily="34" charset="0"/>
+                <a:ea typeface="Source Sans Pro" panose="020B0503030403020204" pitchFamily="34" charset="0"/>
+              </a:rPr>
               <a:t>sugar</a:t>
             </a:r>
             <a:r>
-              <a:rPr lang="en-US" sz="1600" dirty="0"/>
+              <a:rPr lang="en-US" sz="1500" dirty="0">
+                <a:latin typeface="Source Sans Pro" panose="020B0503030403020204" pitchFamily="34" charset="0"/>
+                <a:ea typeface="Source Sans Pro" panose="020B0503030403020204" pitchFamily="34" charset="0"/>
+              </a:rPr>
               <a:t>. It is </a:t>
             </a:r>
             <a:r>
-              <a:rPr lang="en-US" sz="1600" b="1" dirty="0"/>
+              <a:rPr lang="en-US" sz="1500" b="1" dirty="0">
+                <a:latin typeface="Source Sans Pro" panose="020B0503030403020204" pitchFamily="34" charset="0"/>
+                <a:ea typeface="Source Sans Pro" panose="020B0503030403020204" pitchFamily="34" charset="0"/>
+              </a:rPr>
               <a:t>toxic</a:t>
             </a:r>
             <a:r>
-              <a:rPr lang="en-US" sz="1600" dirty="0"/>
+              <a:rPr lang="en-US" sz="1500" dirty="0">
+                <a:latin typeface="Source Sans Pro" panose="020B0503030403020204" pitchFamily="34" charset="0"/>
+                <a:ea typeface="Source Sans Pro" panose="020B0503030403020204" pitchFamily="34" charset="0"/>
+              </a:rPr>
               <a:t>. Her friend </a:t>
             </a:r>
             <a:r>
-              <a:rPr lang="en-US" sz="1600" b="1" dirty="0"/>
+              <a:rPr lang="en-US" sz="1500" b="1" dirty="0">
+                <a:latin typeface="Source Sans Pro" panose="020B0503030403020204" pitchFamily="34" charset="0"/>
+                <a:ea typeface="Source Sans Pro" panose="020B0503030403020204" pitchFamily="34" charset="0"/>
+              </a:rPr>
               <a:t>dies</a:t>
             </a:r>
             <a:r>
-              <a:rPr lang="en-US" sz="1600" dirty="0"/>
+              <a:rPr lang="en-US" sz="1500" dirty="0">
+                <a:latin typeface="Source Sans Pro" panose="020B0503030403020204" pitchFamily="34" charset="0"/>
+                <a:ea typeface="Source Sans Pro" panose="020B0503030403020204" pitchFamily="34" charset="0"/>
+              </a:rPr>
               <a:t>.</a:t>
             </a:r>
           </a:p>
@@ -12925,7 +13021,7 @@
         <p:spPr>
           <a:xfrm>
             <a:off x="8447093" y="2090672"/>
-            <a:ext cx="1533646" cy="1077218"/>
+            <a:ext cx="1533646" cy="1015663"/>
           </a:xfrm>
           <a:prstGeom prst="rect">
             <a:avLst/>
@@ -12940,31 +13036,52 @@
           <a:p>
             <a:pPr algn="ctr"/>
             <a:r>
-              <a:rPr lang="en-US" sz="1600" dirty="0"/>
+              <a:rPr lang="en-US" sz="1500" dirty="0">
+                <a:latin typeface="Source Sans Pro" panose="020B0503030403020204" pitchFamily="34" charset="0"/>
+                <a:ea typeface="Source Sans Pro" panose="020B0503030403020204" pitchFamily="34" charset="0"/>
+              </a:rPr>
               <a:t>Grace thinks the powder is </a:t>
             </a:r>
             <a:r>
-              <a:rPr lang="en-US" sz="1600" b="1" dirty="0"/>
+              <a:rPr lang="en-US" sz="1500" b="1" dirty="0">
+                <a:latin typeface="Source Sans Pro" panose="020B0503030403020204" pitchFamily="34" charset="0"/>
+                <a:ea typeface="Source Sans Pro" panose="020B0503030403020204" pitchFamily="34" charset="0"/>
+              </a:rPr>
               <a:t>toxic</a:t>
             </a:r>
             <a:r>
-              <a:rPr lang="en-US" sz="1600" dirty="0"/>
+              <a:rPr lang="en-US" sz="1500" dirty="0">
+                <a:latin typeface="Source Sans Pro" panose="020B0503030403020204" pitchFamily="34" charset="0"/>
+                <a:ea typeface="Source Sans Pro" panose="020B0503030403020204" pitchFamily="34" charset="0"/>
+              </a:rPr>
               <a:t>. It is </a:t>
             </a:r>
             <a:r>
-              <a:rPr lang="en-US" sz="1600" b="1" dirty="0"/>
+              <a:rPr lang="en-US" sz="1500" b="1" dirty="0">
+                <a:latin typeface="Source Sans Pro" panose="020B0503030403020204" pitchFamily="34" charset="0"/>
+                <a:ea typeface="Source Sans Pro" panose="020B0503030403020204" pitchFamily="34" charset="0"/>
+              </a:rPr>
               <a:t>sugar</a:t>
             </a:r>
             <a:r>
-              <a:rPr lang="en-US" sz="1600" dirty="0"/>
+              <a:rPr lang="en-US" sz="1500" dirty="0">
+                <a:latin typeface="Source Sans Pro" panose="020B0503030403020204" pitchFamily="34" charset="0"/>
+                <a:ea typeface="Source Sans Pro" panose="020B0503030403020204" pitchFamily="34" charset="0"/>
+              </a:rPr>
               <a:t>. Her friend </a:t>
             </a:r>
             <a:r>
-              <a:rPr lang="en-US" sz="1600" b="1" dirty="0"/>
+              <a:rPr lang="en-US" sz="1500" b="1" dirty="0">
+                <a:latin typeface="Source Sans Pro" panose="020B0503030403020204" pitchFamily="34" charset="0"/>
+                <a:ea typeface="Source Sans Pro" panose="020B0503030403020204" pitchFamily="34" charset="0"/>
+              </a:rPr>
               <a:t>is fine</a:t>
             </a:r>
             <a:r>
-              <a:rPr lang="en-US" sz="1600" dirty="0"/>
+              <a:rPr lang="en-US" sz="1500" dirty="0">
+                <a:latin typeface="Source Sans Pro" panose="020B0503030403020204" pitchFamily="34" charset="0"/>
+                <a:ea typeface="Source Sans Pro" panose="020B0503030403020204" pitchFamily="34" charset="0"/>
+              </a:rPr>
               <a:t>.</a:t>
             </a:r>
           </a:p>
@@ -12985,7 +13102,7 @@
         <p:spPr>
           <a:xfrm>
             <a:off x="8427292" y="3484623"/>
-            <a:ext cx="1612301" cy="1077218"/>
+            <a:ext cx="1612301" cy="1015663"/>
           </a:xfrm>
           <a:prstGeom prst="rect">
             <a:avLst/>
@@ -13000,31 +13117,52 @@
           <a:p>
             <a:pPr algn="ctr"/>
             <a:r>
-              <a:rPr lang="en-US" sz="1600" dirty="0"/>
+              <a:rPr lang="en-US" sz="1500" dirty="0">
+                <a:latin typeface="Source Sans Pro" panose="020B0503030403020204" pitchFamily="34" charset="0"/>
+                <a:ea typeface="Source Sans Pro" panose="020B0503030403020204" pitchFamily="34" charset="0"/>
+              </a:rPr>
               <a:t>Grace thinks the powder is </a:t>
             </a:r>
             <a:r>
-              <a:rPr lang="en-US" sz="1600" b="1" dirty="0"/>
+              <a:rPr lang="en-US" sz="1500" b="1" dirty="0">
+                <a:latin typeface="Source Sans Pro" panose="020B0503030403020204" pitchFamily="34" charset="0"/>
+                <a:ea typeface="Source Sans Pro" panose="020B0503030403020204" pitchFamily="34" charset="0"/>
+              </a:rPr>
               <a:t>sugar</a:t>
             </a:r>
             <a:r>
-              <a:rPr lang="en-US" sz="1600" dirty="0"/>
+              <a:rPr lang="en-US" sz="1500" dirty="0">
+                <a:latin typeface="Source Sans Pro" panose="020B0503030403020204" pitchFamily="34" charset="0"/>
+                <a:ea typeface="Source Sans Pro" panose="020B0503030403020204" pitchFamily="34" charset="0"/>
+              </a:rPr>
               <a:t>. It is </a:t>
             </a:r>
             <a:r>
-              <a:rPr lang="en-US" sz="1600" b="1" dirty="0"/>
+              <a:rPr lang="en-US" sz="1500" b="1" dirty="0">
+                <a:latin typeface="Source Sans Pro" panose="020B0503030403020204" pitchFamily="34" charset="0"/>
+                <a:ea typeface="Source Sans Pro" panose="020B0503030403020204" pitchFamily="34" charset="0"/>
+              </a:rPr>
               <a:t>sugar</a:t>
             </a:r>
             <a:r>
-              <a:rPr lang="en-US" sz="1600" dirty="0"/>
+              <a:rPr lang="en-US" sz="1500" dirty="0">
+                <a:latin typeface="Source Sans Pro" panose="020B0503030403020204" pitchFamily="34" charset="0"/>
+                <a:ea typeface="Source Sans Pro" panose="020B0503030403020204" pitchFamily="34" charset="0"/>
+              </a:rPr>
               <a:t>. Her friend </a:t>
             </a:r>
             <a:r>
-              <a:rPr lang="en-US" sz="1600" b="1" dirty="0"/>
+              <a:rPr lang="en-US" sz="1500" b="1" dirty="0">
+                <a:latin typeface="Source Sans Pro" panose="020B0503030403020204" pitchFamily="34" charset="0"/>
+                <a:ea typeface="Source Sans Pro" panose="020B0503030403020204" pitchFamily="34" charset="0"/>
+              </a:rPr>
               <a:t>is fine</a:t>
             </a:r>
             <a:r>
-              <a:rPr lang="en-US" sz="1600" dirty="0"/>
+              <a:rPr lang="en-US" sz="1500" dirty="0">
+                <a:latin typeface="Source Sans Pro" panose="020B0503030403020204" pitchFamily="34" charset="0"/>
+                <a:ea typeface="Source Sans Pro" panose="020B0503030403020204" pitchFamily="34" charset="0"/>
+              </a:rPr>
               <a:t>.</a:t>
             </a:r>
           </a:p>
@@ -13187,7 +13325,10 @@
             <a:lstStyle/>
             <a:p>
               <a:pPr algn="ctr"/>
-              <a:endParaRPr lang="en-US"/>
+              <a:endParaRPr lang="en-US">
+                <a:latin typeface="Source Sans Pro" panose="020B0503030403020204" pitchFamily="34" charset="0"/>
+                <a:ea typeface="Source Sans Pro" panose="020B0503030403020204" pitchFamily="34" charset="0"/>
+              </a:endParaRPr>
             </a:p>
           </p:txBody>
         </p:sp>
@@ -13417,8 +13558,8 @@
           </p:pic>
         </mc:Fallback>
       </mc:AlternateContent>
-      <mc:AlternateContent xmlns:mc="http://schemas.openxmlformats.org/markup-compatibility/2006" xmlns:a14="http://schemas.microsoft.com/office/drawing/2010/main">
-        <mc:Choice Requires="a14">
+      <mc:AlternateContent xmlns:mc="http://schemas.openxmlformats.org/markup-compatibility/2006">
+        <mc:Choice xmlns:a14="http://schemas.microsoft.com/office/drawing/2010/main" Requires="a14">
           <p:sp>
             <p:nvSpPr>
               <p:cNvPr id="23" name="TextBox 22">
@@ -13508,12 +13649,15 @@
                     </m:oMath>
                   </m:oMathPara>
                 </a14:m>
-                <a:endParaRPr lang="en-US" dirty="0"/>
+                <a:endParaRPr lang="en-US" dirty="0">
+                  <a:latin typeface="Source Sans Pro" panose="020B0503030403020204" pitchFamily="34" charset="0"/>
+                  <a:ea typeface="Source Sans Pro" panose="020B0503030403020204" pitchFamily="34" charset="0"/>
+                </a:endParaRPr>
               </a:p>
             </p:txBody>
           </p:sp>
         </mc:Choice>
-        <mc:Fallback xmlns="">
+        <mc:Fallback>
           <p:sp>
             <p:nvSpPr>
               <p:cNvPr id="23" name="TextBox 22">
@@ -13558,8 +13702,8 @@
           </p:sp>
         </mc:Fallback>
       </mc:AlternateContent>
-      <mc:AlternateContent xmlns:mc="http://schemas.openxmlformats.org/markup-compatibility/2006" xmlns:a14="http://schemas.microsoft.com/office/drawing/2010/main">
-        <mc:Choice Requires="a14">
+      <mc:AlternateContent xmlns:mc="http://schemas.openxmlformats.org/markup-compatibility/2006">
+        <mc:Choice xmlns:a14="http://schemas.microsoft.com/office/drawing/2010/main" Requires="a14">
           <p:sp>
             <p:nvSpPr>
               <p:cNvPr id="24" name="TextBox 23">
@@ -13649,12 +13793,15 @@
                     </m:oMath>
                   </m:oMathPara>
                 </a14:m>
-                <a:endParaRPr lang="en-US" dirty="0"/>
+                <a:endParaRPr lang="en-US" dirty="0">
+                  <a:latin typeface="Source Sans Pro" panose="020B0503030403020204" pitchFamily="34" charset="0"/>
+                  <a:ea typeface="Source Sans Pro" panose="020B0503030403020204" pitchFamily="34" charset="0"/>
+                </a:endParaRPr>
               </a:p>
             </p:txBody>
           </p:sp>
         </mc:Choice>
-        <mc:Fallback xmlns="">
+        <mc:Fallback>
           <p:sp>
             <p:nvSpPr>
               <p:cNvPr id="24" name="TextBox 23">
@@ -13699,8 +13846,8 @@
           </p:sp>
         </mc:Fallback>
       </mc:AlternateContent>
-      <mc:AlternateContent xmlns:mc="http://schemas.openxmlformats.org/markup-compatibility/2006" xmlns:a14="http://schemas.microsoft.com/office/drawing/2010/main">
-        <mc:Choice Requires="a14">
+      <mc:AlternateContent xmlns:mc="http://schemas.openxmlformats.org/markup-compatibility/2006">
+        <mc:Choice xmlns:a14="http://schemas.microsoft.com/office/drawing/2010/main" Requires="a14">
           <p:sp>
             <p:nvSpPr>
               <p:cNvPr id="25" name="TextBox 24">
@@ -13902,12 +14049,15 @@
                     </m:oMath>
                   </m:oMathPara>
                 </a14:m>
-                <a:endParaRPr lang="en-US" dirty="0"/>
+                <a:endParaRPr lang="en-US" dirty="0">
+                  <a:latin typeface="Source Sans Pro" panose="020B0503030403020204" pitchFamily="34" charset="0"/>
+                  <a:ea typeface="Source Sans Pro" panose="020B0503030403020204" pitchFamily="34" charset="0"/>
+                </a:endParaRPr>
               </a:p>
             </p:txBody>
           </p:sp>
         </mc:Choice>
-        <mc:Fallback xmlns="">
+        <mc:Fallback>
           <p:sp>
             <p:nvSpPr>
               <p:cNvPr id="25" name="TextBox 24">
@@ -13967,7 +14117,7 @@
         <p:spPr>
           <a:xfrm>
             <a:off x="6224781" y="881308"/>
-            <a:ext cx="1497076" cy="369332"/>
+            <a:ext cx="1545616" cy="369332"/>
           </a:xfrm>
           <a:prstGeom prst="rect">
             <a:avLst/>
@@ -13981,7 +14131,10 @@
           <a:lstStyle/>
           <a:p>
             <a:r>
-              <a:rPr lang="en-US" dirty="0"/>
+              <a:rPr lang="en-US" dirty="0">
+                <a:latin typeface="Source Sans Pro" panose="020B0503030403020204" pitchFamily="34" charset="0"/>
+                <a:ea typeface="Source Sans Pro" panose="020B0503030403020204" pitchFamily="34" charset="0"/>
+              </a:rPr>
               <a:t>Simple effects</a:t>
             </a:r>
           </a:p>
@@ -14002,7 +14155,7 @@
         <p:spPr>
           <a:xfrm>
             <a:off x="8915773" y="1534193"/>
-            <a:ext cx="1793889" cy="369332"/>
+            <a:ext cx="1842171" cy="369332"/>
           </a:xfrm>
           <a:prstGeom prst="rect">
             <a:avLst/>
@@ -14016,7 +14169,10 @@
           <a:lstStyle/>
           <a:p>
             <a:r>
-              <a:rPr lang="en-US" dirty="0"/>
+              <a:rPr lang="en-US" dirty="0">
+                <a:latin typeface="Source Sans Pro" panose="020B0503030403020204" pitchFamily="34" charset="0"/>
+                <a:ea typeface="Source Sans Pro" panose="020B0503030403020204" pitchFamily="34" charset="0"/>
+              </a:rPr>
               <a:t>interaction effect</a:t>
             </a:r>
           </a:p>

</xml_diff>

<commit_message>
fixing lots of figures and captions
</commit_message>
<xml_diff>
--- a/images/design/src/dose-response.pptx
+++ b/images/design/src/dose-response.pptx
@@ -8,7 +8,8 @@
     <p:sldId id="256" r:id="rId2"/>
     <p:sldId id="257" r:id="rId3"/>
     <p:sldId id="258" r:id="rId4"/>
-    <p:sldId id="259" r:id="rId5"/>
+    <p:sldId id="260" r:id="rId5"/>
+    <p:sldId id="259" r:id="rId6"/>
   </p:sldIdLst>
   <p:sldSz cx="12192000" cy="6858000"/>
   <p:notesSz cx="6858000" cy="9144000"/>
@@ -525,6 +526,198 @@
 </file>
 
 <file path=ppt/ink/ink112.xml><?xml version="1.0" encoding="utf-8"?>
+<inkml:ink xmlns:inkml="http://www.w3.org/2003/InkML">
+  <inkml:definitions>
+    <inkml:context xml:id="ctx0">
+      <inkml:inkSource xml:id="inkSrc0">
+        <inkml:traceFormat>
+          <inkml:channel name="X" type="integer" min="-2.14748E9" max="2.14748E9" units="cm"/>
+          <inkml:channel name="Y" type="integer" min="-2.14748E9" max="2.14748E9" units="cm"/>
+          <inkml:channel name="F" type="integer" max="32767" units="dev"/>
+        </inkml:traceFormat>
+        <inkml:channelProperties>
+          <inkml:channelProperty channel="X" name="resolution" value="1000" units="1/cm"/>
+          <inkml:channelProperty channel="Y" name="resolution" value="1000" units="1/cm"/>
+          <inkml:channelProperty channel="F" name="resolution" value="0" units="1/dev"/>
+        </inkml:channelProperties>
+      </inkml:inkSource>
+      <inkml:timestamp xml:id="ts0" timeString="2022-09-14T18:03:39.694"/>
+    </inkml:context>
+    <inkml:brush xml:id="br0">
+      <inkml:brushProperty name="width" value="0.1" units="cm"/>
+      <inkml:brushProperty name="height" value="0.1" units="cm"/>
+      <inkml:brushProperty name="color" value="#A9A9A9"/>
+    </inkml:brush>
+  </inkml:definitions>
+  <inkml:trace contextRef="#ctx0" brushRef="#br0">1058 0 24575,'-9'38'0,"7"-10"0,-17 11 0,17-14 0,-17 21 0,6 5 0,-10 32 0,5-14 0,-3 11 0,2 0 0,1-18 0,-5 11 0,5-11 0,-4-11 0,4 19 0,-3-12 0,3 4 0,1-6 0,-4-1 0,9 1 0,-14 17 0,13-19 0,-13 19 0,15-30 0,-5 11 0,5-11 0,0 11 0,1-11 0,4 5 0,-3-7 0,3 0 0,-4 1 0,-1-1 0,5 0 0,-7 0 0,6 1 0,-8-1 0,5 0 0,-1 0 0,-4 7 0,3-6 0,1 6 0,2-1 0,7-4 0,-7 43 0,2-29 0,1 31 0,-4-32 0,4-7 0,-5 6 0,6-6 0,-5 0 0,4-1 0,1-13 0,-5 5 0,5-10 0,-1 4 0,-2-5 0,7-6 0,-7-1 0,7 0 0,-3-8 0,4 7 0,-4-8 0,3 0 0,-6 3 0,6-7 0,-3 3 0,0 0 0,3-3 0,-3 6 0,4-6 0,-3-1 0,2-1 0,-3-3 0,4 3 0,0 1 0,-3 0 0,2-1 0,-2 1 0,-1-4 0,0-1 0,-3-3 0,-4 0 0,2 0 0,-6 0 0,6 0 0,-7-4 0,3-4 0,-1-11 0,-3 1 0,8-5 0,-4 6 0,1 4 0,6-4 0,-5 8 0,6-3 0,-2 5 0,2-1 0,-1 4 0,2-3 0,-4 3 0,1-3 0,-1-1 0,-4 0 0,3 0 0,-3-1 0,4 2 0,0-1 0,0 4 0,4-3 0,-3 2 0,7-2 0,3 3 0,2 4 0,10 5 0,-2 3 0,9 5 0,-4 1 0,5 4 0,-10-1 0,3-3 0,-6 2 0,2-7 0,-4 3 0,0-4 0,-4 0 0,0 0 0,-1-4 0,-2 3 0,6-7 0,-6 7 0,6-2 0,-3 2 0,4-2 0,-4 2 0,3-7 0,-3 7 0,1-3 0,1 0 0,-1 3 0,2-6 0,1 6 0,0-3 0,0 0 0,0 0 0,-1-1 0,1-2 0,0 3 0,-4-1 0,0 1 0,-4 3 0,3-3 0,1-1 0,8-3 0,1-3 0,9-7 0,2-4 0,10-6 0,-4 1 0,4-1 0,-6 1 0,-4 1 0,-6 4 0,-6 2 0,0 4 0,-3 4 0,3-4 0,-5 4 0,1 0 0,4-4 0,1 4 0,10-10 0,-5 8 0,4-6 0,-9 8 0,3-5 0,-7 5 0,3 0 0,-7 4 0,-2 0 0</inkml:trace>
+</inkml:ink>
+</file>
+
+<file path=ppt/ink/ink113.xml><?xml version="1.0" encoding="utf-8"?>
+<inkml:ink xmlns:inkml="http://www.w3.org/2003/InkML">
+  <inkml:definitions>
+    <inkml:context xml:id="ctx0">
+      <inkml:inkSource xml:id="inkSrc0">
+        <inkml:traceFormat>
+          <inkml:channel name="X" type="integer" min="-2.14748E9" max="2.14748E9" units="cm"/>
+          <inkml:channel name="Y" type="integer" min="-2.14748E9" max="2.14748E9" units="cm"/>
+          <inkml:channel name="F" type="integer" max="32767" units="dev"/>
+        </inkml:traceFormat>
+        <inkml:channelProperties>
+          <inkml:channelProperty channel="X" name="resolution" value="1000" units="1/cm"/>
+          <inkml:channelProperty channel="Y" name="resolution" value="1000" units="1/cm"/>
+          <inkml:channelProperty channel="F" name="resolution" value="0" units="1/dev"/>
+        </inkml:channelProperties>
+      </inkml:inkSource>
+      <inkml:timestamp xml:id="ts0" timeString="2022-09-14T17:55:48.359"/>
+    </inkml:context>
+    <inkml:brush xml:id="br0">
+      <inkml:brushProperty name="width" value="0.1" units="cm"/>
+      <inkml:brushProperty name="height" value="0.1" units="cm"/>
+    </inkml:brush>
+  </inkml:definitions>
+  <inkml:trace contextRef="#ctx0" brushRef="#br0">1 0 24575,'11'0'0,"0"0"0,-3 0 0,-1 0 0,5 0 0,1 0 0,0 0 0,3 0 0,-7 0 0,8 0 0,-9 0 0,4 0 0,0 0 0,-3 0 0,8 0 0,-4 0 0,4 0 0,0 0 0,0 0 0,1 0 0,-1 0 0,5 0 0,-3 0 0,8 0 0,-8 0 0,8 0 0,-9 4 0,5-3 0,-10 6 0,3-2 0,-7-1 0,7 0 0,-7 0 0,3-4 0,-4 4 0,-1-1 0,1-2 0,0 3 0,0-4 0,0 3 0,-1-2 0,1 3 0,0-1 0,0-2 0,0 2 0,-1 1 0,1-3 0,0 2 0,0-3 0,0 0 0,-1 0 0,1 0 0,4 0 0,-4 0 0,0 0 0,-5 0 0</inkml:trace>
+</inkml:ink>
+</file>
+
+<file path=ppt/ink/ink114.xml><?xml version="1.0" encoding="utf-8"?>
+<inkml:ink xmlns:inkml="http://www.w3.org/2003/InkML">
+  <inkml:definitions>
+    <inkml:context xml:id="ctx0">
+      <inkml:inkSource xml:id="inkSrc0">
+        <inkml:traceFormat>
+          <inkml:channel name="X" type="integer" min="-2.14748E9" max="2.14748E9" units="cm"/>
+          <inkml:channel name="Y" type="integer" min="-2.14748E9" max="2.14748E9" units="cm"/>
+          <inkml:channel name="F" type="integer" max="32767" units="dev"/>
+        </inkml:traceFormat>
+        <inkml:channelProperties>
+          <inkml:channelProperty channel="X" name="resolution" value="1000" units="1/cm"/>
+          <inkml:channelProperty channel="Y" name="resolution" value="1000" units="1/cm"/>
+          <inkml:channelProperty channel="F" name="resolution" value="0" units="1/dev"/>
+        </inkml:channelProperties>
+      </inkml:inkSource>
+      <inkml:timestamp xml:id="ts0" timeString="2022-09-14T17:55:56.651"/>
+    </inkml:context>
+    <inkml:brush xml:id="br0">
+      <inkml:brushProperty name="width" value="0.1" units="cm"/>
+      <inkml:brushProperty name="height" value="0.1" units="cm"/>
+    </inkml:brush>
+  </inkml:definitions>
+  <inkml:trace contextRef="#ctx0" brushRef="#br0">582 0 24575,'0'21'0,"0"1"0,0 6 0,0 0 0,0 1 0,0 5 0,0-4 0,0 10 0,0-5 0,0 7 0,0-1 0,0 7 0,0-6 0,0 13 0,0-6 0,0 7 0,0-7 0,0 5 0,5-11 0,-4 5 0,8-7 0,-3 1 0,0-1 0,-2-5 0,1 10 0,0-14 0,4 9 0,1-13 0,-5 1 0,4 5 0,-4-4 0,1 16 0,3-9 0,-8 18 0,4-6 0,-1 7 0,-2 0 0,3-1 0,-5 1 0,0-6 0,0 4 0,0-11 0,4 4 0,-3-5 0,4-1 0,-5 0 0,0 7 0,0-5 0,0 5 0,0-7 0,0 24 0,0-11 0,0 20 0,0-19 0,0 1 0,0-6 0,-5 4 0,4-11 0,-4-1 0,5-8 0,0-6 0,0 1 0,0-6 0,0-1 0,0-4 0,0 4 0,0 2 0,0 4 0,0 0 0,0 7 0,0 7 0,0 1 0,0 11 0,0-11 0,0 4 0,0-5 0,0-1 0,0-6 0,0-1 0,0-5 0,0 5 0,0-5 0,0 11 0,0-4 0,0 5 0,0 0 0,0 1 0,0-1 0,0 0 0,0-5 0,0-2 0,0-11 0,0 0 0,0-10 0,0-1 0,0-4 0,0-1 0,0 5 0,0 6 0,0 6 0,0 10 0,0 2 0,0 5 0,0 0 0,0-5 0,0 4 0,0-5 0,0 1 0,0 4 0,0-10 0,0 4 0,0-6 0,0-4 0,0 3 0,0-9 0,0 5 0,0-6 0,0-4 0,0-1 0,0-4 0,0-1 0,0 1 0,0 0 0,0 0 0,-4 9 0,3-3 0,-4 8 0,5-5 0,-3 1 0,2-5 0,-3-1 0,4 0 0,0 0 0,0 1 0,0-2 0,0 6 0,0 2 0,-4 9 0,3 7 0,-4-5 0,5 4 0,0-6 0,0 1 0,0-6 0,0-5 0,0-6 0,0-4 0,0 0 0,0-1 0,0 1 0,0-1 0,0 4 0,0 2 0,0 8 0,0-3 0,0 4 0,0-9 0,0 4 0,0-8 0,0 3 0,0-5 0,0 1 0,0 3 0,0 1 0,0 9 0,0 3 0,0-1 0,0 4 0,0-8 0,0 3 0,0-5 0,0 1 0,0-1 0,0 0 0,0 0 0,0-3 0,0 2 0,0-7 0,0 3 0,0-5 0,0 1 0,0 0 0,0-1 0,0 1 0,0-1 0,0 1 0,0 0 0,0 0 0,0-1 0,0 1 0,0 4 0,4-3 0,-3 3 0,2-4 0,-3 0 0,0 0 0,0-1 0,0 1 0,0 0 0,0 0 0,0 0 0,0 4 0,0 1 0,0 4 0,0 0 0,0 5 0,0-3 0,0 8 0,0-8 0,0 8 0,0-4 0,0 6 0,0-1 0,0 1 0,0-1 0,0 0 0,0-4 0,0 3 0,0-8 0,0-1 0,0-2 0,0-3 0,0 4 0,0-4 0,0 3 0,0-2 0,0 3 0,0 5 0,0 2 0,4 4 0,-3-5 0,8 5 0,-4-10 0,0 4 0,3-1 0,-7-7 0,2 2 0,-3-9 0,0 1 0,0 0 0,0 4 0,0 0 0,0 6 0,0-1 0,0 0 0,0 1 0,0-1 0,0-4 0,0-1 0,0-4 0,0 0 0,0-1 0,0 1 0,0 0 0,0-1 0,0 10 0,0-3 0,0 14 0,0-5 0,0 6 0,0-1 0,0 6 0,0-4 0,0 4 0,0-5 0,-3-6 0,2 4 0,-3-8 0,0 3 0,3-5 0,-3 1 0,4-1 0,0 0 0,0 0 0,0 1 0,0-1 0,0 5 0,0-3 0,0 3 0,0-9 0,0 3 0,0-7 0,-3 3 0,2-4 0,-3 0 0,4 0 0,0-1 0,0 1 0,0-1 0,0 1 0,0 3 0,0 3 0,0 3 0,0 0 0,0 5 0,0-3 0,0 8 0,0-8 0,0 8 0,0-9 0,0 5 0,0-6 0,0 0 0,0-4 0,0-1 0,0-4 0,0 0 0,0-1 0,0 1 0,0 4 0,0 6 0,0 5 0,0 11 0,0 8 0,0 1 0,0 5 0,0-12 0,0 3 0,0-14 0,0 3 0,0-10 0,0-5 0,0-1 0,0-5 0,0 1 0,0 0 0,0-1 0,0 0 0,0 0 0,-6-3 0,1 3 0,-6-6 0,3 2 0,1-3 0,-1 0 0,0 0 0,1 0 0,-1 0 0,-4 0 0,3 0 0,-7 0 0,3 0 0,-4 0 0,-1 0 0,1 0 0,0 0 0,0 0 0,4 0 0,-4 0 0,8 0 0,-7 0 0,7 0 0,-3 0 0,5 0 0,-1 0 0,1 0 0,0 0 0,-1 0 0,1 0 0,0 0 0,-5 0 0,3 0 0,-3 0 0,4 0 0,0 0 0,1 0 0,0 0 0,-1 0 0,-2 0 0,2 0 0,-2 0 0,2 0 0,-2 0 0,2 0 0,-3 0 0,3 0 0,1 0 0,-1 4 0,0-3 0,0 5 0,1-5 0,-1 2 0,1-3 0,-1 0 0,0 0 0,1 0 0,0 0 0,-5 0 0,-1 0 0,-4 0 0,0 0 0,4 0 0,-4 0 0,9 0 0,-4 0 0,4 0 0,3 0 0,2 0 0</inkml:trace>
+</inkml:ink>
+</file>
+
+<file path=ppt/ink/ink115.xml><?xml version="1.0" encoding="utf-8"?>
+<inkml:ink xmlns:inkml="http://www.w3.org/2003/InkML">
+  <inkml:definitions>
+    <inkml:context xml:id="ctx0">
+      <inkml:inkSource xml:id="inkSrc0">
+        <inkml:traceFormat>
+          <inkml:channel name="X" type="integer" min="-2.14748E9" max="2.14748E9" units="cm"/>
+          <inkml:channel name="Y" type="integer" min="-2.14748E9" max="2.14748E9" units="cm"/>
+          <inkml:channel name="F" type="integer" max="32767" units="dev"/>
+        </inkml:traceFormat>
+        <inkml:channelProperties>
+          <inkml:channelProperty channel="X" name="resolution" value="1000" units="1/cm"/>
+          <inkml:channelProperty channel="Y" name="resolution" value="1000" units="1/cm"/>
+          <inkml:channelProperty channel="F" name="resolution" value="0" units="1/dev"/>
+        </inkml:channelProperties>
+      </inkml:inkSource>
+      <inkml:timestamp xml:id="ts0" timeString="2022-09-14T17:56:05.559"/>
+    </inkml:context>
+    <inkml:brush xml:id="br0">
+      <inkml:brushProperty name="width" value="0.1" units="cm"/>
+      <inkml:brushProperty name="height" value="0.1" units="cm"/>
+    </inkml:brush>
+  </inkml:definitions>
+  <inkml:trace contextRef="#ctx0" brushRef="#br0">1 0 24575,'12'0'0,"0"0"0,-3 0 0,0 0 0,0 0 0,-1 0 0,0 0 0,1 0 0,0 0 0,0 0 0,-1 0 0,6 0 0,-6 0 0,6 0 0,-6 0 0,1 0 0,0 0 0,0 0 0,-1 0 0,0 0 0,0 0 0,1 0 0,0 0 0,-1 0 0,6 0 0,-4 0 0,3 0 0,0 0 0,-3 0 0,3 0 0,-5 0 0,1 0 0,-1 0 0,1 0 0,-1 0 0,1 0 0,-2 0 0,2 0 0,0 0 0,-1 0 0,5 0 0,-3 0 0,3 0 0,-4 0 0,0 0 0,0 0 0,-2 0 0,2 0 0,-1 0 0,1 0 0,4 0 0,1 0 0,0 0 0,4 0 0,-8 0 0,3 0 0,-4 0 0,0 0 0,0 0 0,-1 0 0,0 0 0,1 0 0,-1 0 0,0 0 0,0 0 0,1 0 0,-1 0 0,-1 0 0,2 0 0,-1 0 0,-4 3 0,0 3 0,-4 2 0,0 0 0,0 1 0,4 4 0,-3-4 0,3 10 0,-4-5 0,4 0 0,-3 4 0,3-4 0,-4 5 0,0 1 0,0-1 0,0 5 0,0-3 0,0 9 0,0-11 0,0 11 0,0-9 0,0 9 0,0-9 0,0 8 0,0-9 0,0 5 0,0 0 0,0-6 0,0 7 0,0-2 0,0 1 0,0 15 0,0-6 0,0 12 0,0-13 0,0 5 0,0-7 0,0 1 0,0-2 0,0 1 0,0 1 0,0-1 0,0-5 0,0 4 0,0-9 0,0 3 0,0-5 0,0 5 0,0-3 0,0 3 0,0-5 0,0 5 0,0-3 0,0 9 0,0-10 0,0 18 0,0-10 0,0 12 0,0-9 0,0-5 0,0 4 0,0-10 0,0 10 0,0-9 0,0 9 0,0-9 0,0 3 0,0 0 0,0-3 0,5 3 0,-4-5 0,6 0 0,-5-5 0,2-1 0,-4-4 0,0 0 0,3-5 0,-2 4 0,3-4 0,0 5 0,-3-1 0,7 5 0,-7 1 0,3 1 0,-4-1 0,4-6 0,-3 0 0,3 1 0,-4 0 0,0-1 0,0 0 0,0 0 0,0 1 0,0-1 0,0 5 0,0 1 0,0 6 0,0-1 0,5-1 0,-5 2 0,4-5 0,-4-2 0,0-5 0,0 0 0,0 1 0,-3-4 0,-6-1 0,-1-4 0,-8 0 0,8 0 0,-7 0 0,7 0 0,-3 0 0,4 0 0,0 0 0,1 0 0,0 0 0,0 0 0,-1 0 0,-4 0 0,-1 0 0,-6 0 0,1 0 0,0 0 0,1 0 0,2 0 0,-1 0 0,7 0 0,-4 0 0,7 0 0,-2 0 0,0 0 0,-4 0 0,-1 0 0,-1 0 0,-2 0 0,7 0 0,-3 0 0,-1 0 0,4 0 0,-3 0 0,4 0 0,2 0 0,-1 0 0,-1 0 0,0 0 0,2 0 0,-2 0 0,1 0 0,-1 0 0,1 0 0,-1 0 0,1 0 0,4 3 0,-1-2 0,5 3 0</inkml:trace>
+</inkml:ink>
+</file>
+
+<file path=ppt/ink/ink116.xml><?xml version="1.0" encoding="utf-8"?>
+<inkml:ink xmlns:inkml="http://www.w3.org/2003/InkML">
+  <inkml:definitions>
+    <inkml:context xml:id="ctx0">
+      <inkml:inkSource xml:id="inkSrc0">
+        <inkml:traceFormat>
+          <inkml:channel name="X" type="integer" min="-2.14748E9" max="2.14748E9" units="cm"/>
+          <inkml:channel name="Y" type="integer" min="-2.14748E9" max="2.14748E9" units="cm"/>
+          <inkml:channel name="F" type="integer" max="32767" units="dev"/>
+        </inkml:traceFormat>
+        <inkml:channelProperties>
+          <inkml:channelProperty channel="X" name="resolution" value="1000" units="1/cm"/>
+          <inkml:channelProperty channel="Y" name="resolution" value="1000" units="1/cm"/>
+          <inkml:channelProperty channel="F" name="resolution" value="0" units="1/dev"/>
+        </inkml:channelProperties>
+      </inkml:inkSource>
+      <inkml:timestamp xml:id="ts0" timeString="2022-09-14T17:56:41.599"/>
+    </inkml:context>
+    <inkml:brush xml:id="br0">
+      <inkml:brushProperty name="width" value="0.1" units="cm"/>
+      <inkml:brushProperty name="height" value="0.1" units="cm"/>
+    </inkml:brush>
+  </inkml:definitions>
+  <inkml:trace contextRef="#ctx0" brushRef="#br0">1 17 24575,'16'0'0,"9"0"0,-11 0 0,13 0 0,-3 0 0,-5 0 0,2 0 0,-8 0 0,5 0 0,-1 0 0,-4-4 0,-1 3 0,0-2 0,-3 3 0,3 0 0,-4 0 0,4 0 0,-3 0 0,7 0 0,0 0 0,2 0 0,-1 0 0,-5 0 0,-4 0 0,0 0 0,4 0 0,-4 0 0,9 0 0,-4 0 0,4 0 0,0 0 0,-4 0 0,4 0 0,-4 0 0,4 0 0,0 0 0,0 0 0,1 0 0,4 0 0,-4 0 0,10 0 0,-5 0 0,6 0 0,-1 0 0,0 0 0,1 0 0,-6-4 0,0 3 0,-6-3 0,0 4 0,-4 0 0,4 0 0,-9 0 0,4 0 0,0 0 0,-3 0 0,3 0 0,-4 0 0,0 0 0,0 0 0,-1 0 0,1 0 0,-1 0 0,5 0 0,-3 0 0,3 0 0,-4 0 0,-1 0 0,1 0 0,-4 6 0,0 9 0,-4 6 0,0 6 0,0 1 0,0-5 0,0 4 0,0-10 0,0 10 0,0-9 0,0 4 0,0-5 0,0 0 0,0 4 0,0-3 0,0 9 0,0-4 0,0 5 0,0-1 0,0-3 0,0 2 0,0-8 0,0 4 0,0-5 0,0-4 0,0 2 0,0-2 0,0 0 0,0 2 0,0-1 0,4 3 0,1-1 0,-1 1 0,0 0 0,-4 0 0,0 0 0,0-1 0,0 2 0,0-2 0,0 1 0,0-4 0,0-2 0,0-3 0,0 4 0,0-3 0,0 2 0,0 1 0,0 1 0,0 4 0,0 0 0,0 0 0,0 4 0,0-2 0,0 7 0,0-7 0,0 2 0,0 1 0,0-4 0,0 4 0,0-6 0,0-3 0,0 3 0,0-4 0,0 6 0,0-1 0,0-1 0,0 2 0,0-5 0,0 2 0,0-2 0,0 3 0,0-3 0,0 4 0,0-9 0,0 3 0,0-3 0,0 0 0,0 0 0,-3-1 0,-2 4 0,1 2 0,-4 5 0,7-2 0,-6-3 0,6 3 0,-3-8 0,4 4 0,0-4 0,0 5 0,0 5 0,0 2 0,0 6 0,0-2 0,0 3 0,0 1 0,0 5 0,0-3 0,0 9 0,0-5 0,0 0 0,0 5 0,0-9 0,0 3 0,0-10 0,0-1 0,0-6 0,0 2 0,0-5 0,0 2 0,0-2 0,0 4 0,0-1 0,0 7 0,0-1 0,0 1 0,-4 4 0,3-5 0,-7 2 0,7 2 0,-7-8 0,7-1 0,-2 0 0,3-9 0,0 4 0,0-1 0,0-2 0,0 7 0,0-7 0,0 7 0,0-3 0,0 4 0,0-1 0,0 2 0,0 3 0,0-3 0,0 4 0,0-9 0,0 3 0,0-8 0,0 4 0,0-5 0,0 1 0,0 3 0,0-2 0,0 15 0,0-5 0,0 7 0,0 0 0,0-2 0,0 3 0,0 0 0,0-3 0,0 2 0,0-7 0,0 2 0,0 1 0,0-4 0,0 4 0,0-1 0,0-2 0,0 7 0,0-8 0,0 4 0,0-5 0,0-1 0,0 2 0,0 5 0,0-3 0,0 0 0,0-4 0,0 2 0,0-1 0,0 10 0,0-4 0,0 10 0,0-3 0,0 3 0,-5-6 0,4 2 0,-3-7 0,4 4 0,0-2 0,0-2 0,0 5 0,0-4 0,0 5 0,0 0 0,0-6 0,0 5 0,0-9 0,0 9 0,0-14 0,0 16 0,0-15 0,0 11 0,0-9 0,0 2 0,0-1 0,0-1 0,0 2 0,0-2 0,0 1 0,0 0 0,0 0 0,0-4 0,0-1 0,0-1 0,0-3 0,0 9 0,0-8 0,0 2 0,0 1 0,0-4 0,0 4 0,0-5 0,0 1 0,0 0 0,0 0 0,0-1 0,0 0 0,0 1 0,0 3 0,0 2 0,0 8 0,0 3 0,0 3 0,0 1 0,0 6 0,0-5 0,0 4 0,0-6 0,0-4 0,0 4 0,0-9 0,0-1 0,0-1 0,0-3 0,0 4 0,0 0 0,0-4 0,0 2 0,0-2 0,0 4 0,0 4 0,0-3 0,0 9 0,0-9 0,0 8 0,0-2 0,0-2 0,0 5 0,0-9 0,0 3 0,0-3 0,0-1 0,0-5 0,0 4 0,0-3 0,0 9 0,0-8 0,0 6 0,0 1 0,0-3 0,0 3 0,0-9 0,0-1 0,0-2 0,0 3 0,0-4 0,0-1 0,0 0 0,0 4 0,0 7 0,0 5 0,0 4 0,0 7 0,0 1 0,0 5 0,0 0 0,0 1 0,0-7 0,0-1 0,0-9 0,0-3 0,0-8 0,0-1 0,0-4 0,0-1 0,0 1 0,0 4 0,4 1 0,1 8 0,4 3 0,-4 3 0,0 0 0,-1 2 0,-3-7 0,7 0 0,-7-10 0,3 0 0,-4-4 0,0 0 0,3 0 0,-2-2 0,6 2 0,-3 0 0,4 0 0,0-1 0,0 0 0,0 5 0,-4-3 0,4 3 0,-7-4 0,5-1 0,-5 0 0,3 1 0,-4-1 0,0 1 0,0-1 0,0 4 0,0 2 0,-4 0 0,3 2 0,-2-6 0,3 3 0,0-4 0,0-1 0,0 0 0,-3-2 0,2 1 0,-2-1 0,-1 2 0,3 4 0,-6 2 0,6 4 0,-7 0 0,7-4 0,-2-1 0,-1-4 0,3-2 0,-2 2 0,3 0 0,0-1 0,-3-3 0,2 3 0,-2-3 0,3 2 0,0 2 0,0 0 0,0 0 0,0 0 0,-3-4 0,-2-1 0,-2-3 0,-1 0 0,0 0 0,4 3 0,-3-2 0,3 2 0,-3-3 0,-1 0 0,-4 0 0,-1 0 0,-4 0 0,0 0 0,-1 0 0,1 0 0,0 0 0,-1 0 0,1 0 0,0 0 0,4 0 0,1 0 0,0 0 0,3 0 0,-7 0 0,3 0 0,0 0 0,-4 0 0,4 0 0,-4 0 0,0 0 0,4 0 0,-3 0 0,7 0 0,-7-3 0,8 2 0,-7-2 0,6 3 0,-6 0 0,6 0 0,-7 0 0,3 0 0,0 0 0,-3 0 0,3 0 0,0 0 0,-4 0 0,9 0 0,-4 0 0,4 0 0,0 0 0,1 0 0,-1 0 0,1 0 0,0 0 0,-5 0 0,4 0 0,-9 0 0,4 0 0,0 3 0,-3-2 0,3 2 0,0-3 0,-3 0 0,7 4 0,-3-3 0,4 2 0,0-3 0,4 0 0,1 0 0</inkml:trace>
+</inkml:ink>
+</file>
+
+<file path=ppt/ink/ink117.xml><?xml version="1.0" encoding="utf-8"?>
+<inkml:ink xmlns:inkml="http://www.w3.org/2003/InkML">
+  <inkml:definitions>
+    <inkml:context xml:id="ctx0">
+      <inkml:inkSource xml:id="inkSrc0">
+        <inkml:traceFormat>
+          <inkml:channel name="X" type="integer" min="-2.14748E9" max="2.14748E9" units="cm"/>
+          <inkml:channel name="Y" type="integer" min="-2.14748E9" max="2.14748E9" units="cm"/>
+          <inkml:channel name="F" type="integer" max="32767" units="dev"/>
+        </inkml:traceFormat>
+        <inkml:channelProperties>
+          <inkml:channelProperty channel="X" name="resolution" value="1000" units="1/cm"/>
+          <inkml:channelProperty channel="Y" name="resolution" value="1000" units="1/cm"/>
+          <inkml:channelProperty channel="F" name="resolution" value="0" units="1/dev"/>
+        </inkml:channelProperties>
+      </inkml:inkSource>
+      <inkml:timestamp xml:id="ts0" timeString="2022-09-14T18:03:31.728"/>
+    </inkml:context>
+    <inkml:brush xml:id="br0">
+      <inkml:brushProperty name="width" value="0.1" units="cm"/>
+      <inkml:brushProperty name="height" value="0.1" units="cm"/>
+      <inkml:brushProperty name="color" value="#A9A9A9"/>
+    </inkml:brush>
+  </inkml:definitions>
+  <inkml:trace contextRef="#ctx0" brushRef="#br0">1490 0 24575,'-17'33'0,"-4"2"0,-2 16 0,-1-3 0,6 1 0,-3 2 0,7-7 0,-2 0 0,2-3 0,4-5 0,1 2 0,0-3 0,2 0 0,-2-4 0,2 10 0,1-3 0,-3 4 0,-2 8 0,-3-7 0,0 14 0,0-6 0,-1 7 0,-5 24 0,7-24 0,-3 17 0,9-26 0,0-4 0,0-2 0,0-1 0,-2-6 0,2 6 0,-3 2 0,4-2 0,-1-5 0,-3 4 0,3-4 0,-5 5 0,-2 3 0,0-3 0,-7 5 0,7-5 0,-7 4 0,3-2 0,-3 3 0,-1-1 0,0 0 0,-6 19 0,5-14 0,-1 13 0,4-19 0,5 5 0,-2-5 0,-2 28 0,1-18 0,-6 25 0,-2-18 0,2 11 0,-2-16 0,4 6 0,0-11 0,-3 0 0,3 0 0,1-8 0,0 2 0,3-2 0,1-4 0,-4 3 0,1-4 0,-7 14 0,-7-3 0,-6 18 0,8-17 0,-5 10 0,16-22 0,-3-1 0,8-12 0,0-2 0,5 0 0,0-6 0,2 1 0,1-1 0,0-5 0,-1 5 0,1-1 0,-3 1 0,5 0 0,-5 0 0,3-5 0,-1 5 0,1-9 0,3 4 0,2-5 0,-2-1 0,5-5 0,-2-3 0,4-7 0,1-4 0,3-2 0,-4 1 0,4 0 0,-6 5 0,2 1 0,-2-1 0,0-5 0,0 1 0,0-7 0,0 3 0,-5-3 0,1-4 0,-6 5 0,3-10 0,-1 8 0,2 1 0,3 7 0,1 4 0,2 0 0,0-4 0,0 4 0,0-4 0,0 4 0,0 1 0,0 6 0,0 13 0,0 4 0,0 10 0,0-4 0,0-2 0,0 3 0,0-6 0,0 2 0,0-6 0,0 0 0,0-6 0,0 1 0,0 1 0,0-1 0,0-1 0,2-3 0,1 4 0,2-8 0,0 7 0,-1-6 0,2 3 0,-1-4 0,-1 0 0,1 3 0,0-2 0,0 3 0,3-4 0,0 0 0,4 0 0,-1 0 0,0 0 0,0 0 0,0 0 0,-2 0 0,1 0 0,-1 0 0,2 0 0,0 0 0,3 0 0,1 0 0,1 0 0,1 0 0,-2 0 0,4 0 0,-4 0 0,-1 0 0,-2 0 0,-4 0 0,0 0 0,-3 0 0,-2 0 0,-2 0 0</inkml:trace>
+</inkml:ink>
+</file>
+
+<file path=ppt/ink/ink118.xml><?xml version="1.0" encoding="utf-8"?>
+<inkml:ink xmlns:inkml="http://www.w3.org/2003/InkML">
+  <inkml:definitions>
+    <inkml:context xml:id="ctx0">
+      <inkml:inkSource xml:id="inkSrc0">
+        <inkml:traceFormat>
+          <inkml:channel name="X" type="integer" min="-2.14748E9" max="2.14748E9" units="cm"/>
+          <inkml:channel name="Y" type="integer" min="-2.14748E9" max="2.14748E9" units="cm"/>
+          <inkml:channel name="F" type="integer" max="32767" units="dev"/>
+        </inkml:traceFormat>
+        <inkml:channelProperties>
+          <inkml:channelProperty channel="X" name="resolution" value="1000" units="1/cm"/>
+          <inkml:channelProperty channel="Y" name="resolution" value="1000" units="1/cm"/>
+          <inkml:channelProperty channel="F" name="resolution" value="0" units="1/dev"/>
+        </inkml:channelProperties>
+      </inkml:inkSource>
+      <inkml:timestamp xml:id="ts0" timeString="2022-09-14T18:03:35.823"/>
+    </inkml:context>
+    <inkml:brush xml:id="br0">
+      <inkml:brushProperty name="width" value="0.1" units="cm"/>
+      <inkml:brushProperty name="height" value="0.1" units="cm"/>
+      <inkml:brushProperty name="color" value="#A9A9A9"/>
+    </inkml:brush>
+  </inkml:definitions>
+  <inkml:trace contextRef="#ctx0" brushRef="#br0">1 0 24575,'0'16'0,"0"1"0,0-4 0,0 3 0,0 1 0,0-2 0,0-2 0,0-2 0,0-3 0,0 9 0,4-3 0,4 8 0,1-10 0,3 4 0,-8-4 0,5 10 0,-5 1 0,1-1 0,4 10 0,-8-7 0,4 8 0,-5 0 0,3-9 0,-2 14 0,3-14 0,0 14 0,1-14 0,5 14 0,-1-15 0,0 10 0,4-5 0,-2 0 0,2 0 0,0-1 0,-2 6 0,6-4 0,-2 4 0,4 0 0,0-4 0,1 10 0,-2-10 0,7 5 0,0-5 0,4 1 0,6-5 0,1 1 0,-2-8 0,11 4 0,-9-3 0,11-3 0,-7 3 0,0-4 0,-6 1 0,4-2 0,4 3 0,-6-5 0,-1 5 0,-14-8 0,-3-1 0,-6 0 0,0 0 0,-5-4 0,1 0 0,-1-4 0,1 0 0,4 0 0,0 0 0,10 0 0,1 0 0,4 0 0,0 0 0,1 0 0,-5 0 0,-1 0 0,-9 0 0,-2 0 0,-3 0 0,-1 0 0,1 0 0,-1 0 0,0 0 0,5 0 0,1 0 0,3 0 0,1 0 0,-5 0 0,0 0 0,-4 0 0,-1 0 0,1 0 0,-1 0 0,-3 3 0,-4-2 0,-8-6 0,-5-9 0,-4-4 0,-2-8 0,2 2 0,-1-3 0,0 4 0,5 2 0,1 8 0,3 1 0,5 5 0,-3 3 0,6-3 0,-1 9 0,5 11 0,2 2 0,13 10 0,-5-8 0,10 0 0,-7 1 0,1-2 0,-1 1 0,2 0 0,-6 0 0,5-5 0,-8 0 0,6-3 0,-6-2 0,2 1 0,-3 0 0,-1 0 0,1-5 0,-1 0 0,0-3 0,1 0 0,-1 0 0,1 0 0,-1 0 0,1 0 0,-1 0 0,1 4 0,-1-3 0,-3 5 0,3-5 0,-7 6 0,7-6 0,-6 6 0,2-4 0,-3 4 0,0 1 0,0-1 0,0 0 0,0 0 0,-7 1 0,-3 0 0,-6 1 0,-7-1 0,6 5 0,-4-3 0,-2 6 0,6-7 0,-4 5 0,8-7 0,1 1 0,5 0 0,-1-4 0,4 0 0,1-4 0</inkml:trace>
+</inkml:ink>
+</file>
+
+<file path=ppt/ink/ink119.xml><?xml version="1.0" encoding="utf-8"?>
 <inkml:ink xmlns:inkml="http://www.w3.org/2003/InkML">
   <inkml:definitions>
     <inkml:context xml:id="ctx0">
@@ -3324,7 +3517,7 @@
           <a:p>
             <a:fld id="{E3A95CAB-516E-DD48-872C-BA867ABD2C8B}" type="datetimeFigureOut">
               <a:rPr lang="en-US" smtClean="0"/>
-              <a:t>12/20/23</a:t>
+              <a:t>1/18/24</a:t>
             </a:fld>
             <a:endParaRPr lang="en-US"/>
           </a:p>
@@ -3522,7 +3715,7 @@
           <a:p>
             <a:fld id="{E3A95CAB-516E-DD48-872C-BA867ABD2C8B}" type="datetimeFigureOut">
               <a:rPr lang="en-US" smtClean="0"/>
-              <a:t>12/20/23</a:t>
+              <a:t>1/18/24</a:t>
             </a:fld>
             <a:endParaRPr lang="en-US"/>
           </a:p>
@@ -3730,7 +3923,7 @@
           <a:p>
             <a:fld id="{E3A95CAB-516E-DD48-872C-BA867ABD2C8B}" type="datetimeFigureOut">
               <a:rPr lang="en-US" smtClean="0"/>
-              <a:t>12/20/23</a:t>
+              <a:t>1/18/24</a:t>
             </a:fld>
             <a:endParaRPr lang="en-US"/>
           </a:p>
@@ -3928,7 +4121,7 @@
           <a:p>
             <a:fld id="{E3A95CAB-516E-DD48-872C-BA867ABD2C8B}" type="datetimeFigureOut">
               <a:rPr lang="en-US" smtClean="0"/>
-              <a:t>12/20/23</a:t>
+              <a:t>1/18/24</a:t>
             </a:fld>
             <a:endParaRPr lang="en-US"/>
           </a:p>
@@ -4203,7 +4396,7 @@
           <a:p>
             <a:fld id="{E3A95CAB-516E-DD48-872C-BA867ABD2C8B}" type="datetimeFigureOut">
               <a:rPr lang="en-US" smtClean="0"/>
-              <a:t>12/20/23</a:t>
+              <a:t>1/18/24</a:t>
             </a:fld>
             <a:endParaRPr lang="en-US"/>
           </a:p>
@@ -4468,7 +4661,7 @@
           <a:p>
             <a:fld id="{E3A95CAB-516E-DD48-872C-BA867ABD2C8B}" type="datetimeFigureOut">
               <a:rPr lang="en-US" smtClean="0"/>
-              <a:t>12/20/23</a:t>
+              <a:t>1/18/24</a:t>
             </a:fld>
             <a:endParaRPr lang="en-US"/>
           </a:p>
@@ -4880,7 +5073,7 @@
           <a:p>
             <a:fld id="{E3A95CAB-516E-DD48-872C-BA867ABD2C8B}" type="datetimeFigureOut">
               <a:rPr lang="en-US" smtClean="0"/>
-              <a:t>12/20/23</a:t>
+              <a:t>1/18/24</a:t>
             </a:fld>
             <a:endParaRPr lang="en-US"/>
           </a:p>
@@ -5021,7 +5214,7 @@
           <a:p>
             <a:fld id="{E3A95CAB-516E-DD48-872C-BA867ABD2C8B}" type="datetimeFigureOut">
               <a:rPr lang="en-US" smtClean="0"/>
-              <a:t>12/20/23</a:t>
+              <a:t>1/18/24</a:t>
             </a:fld>
             <a:endParaRPr lang="en-US"/>
           </a:p>
@@ -5134,7 +5327,7 @@
           <a:p>
             <a:fld id="{E3A95CAB-516E-DD48-872C-BA867ABD2C8B}" type="datetimeFigureOut">
               <a:rPr lang="en-US" smtClean="0"/>
-              <a:t>12/20/23</a:t>
+              <a:t>1/18/24</a:t>
             </a:fld>
             <a:endParaRPr lang="en-US"/>
           </a:p>
@@ -5445,7 +5638,7 @@
           <a:p>
             <a:fld id="{E3A95CAB-516E-DD48-872C-BA867ABD2C8B}" type="datetimeFigureOut">
               <a:rPr lang="en-US" smtClean="0"/>
-              <a:t>12/20/23</a:t>
+              <a:t>1/18/24</a:t>
             </a:fld>
             <a:endParaRPr lang="en-US"/>
           </a:p>
@@ -5733,7 +5926,7 @@
           <a:p>
             <a:fld id="{E3A95CAB-516E-DD48-872C-BA867ABD2C8B}" type="datetimeFigureOut">
               <a:rPr lang="en-US" smtClean="0"/>
-              <a:t>12/20/23</a:t>
+              <a:t>1/18/24</a:t>
             </a:fld>
             <a:endParaRPr lang="en-US"/>
           </a:p>
@@ -5974,7 +6167,7 @@
           <a:p>
             <a:fld id="{E3A95CAB-516E-DD48-872C-BA867ABD2C8B}" type="datetimeFigureOut">
               <a:rPr lang="en-US" smtClean="0"/>
-              <a:t>12/20/23</a:t>
+              <a:t>1/18/24</a:t>
             </a:fld>
             <a:endParaRPr lang="en-US"/>
           </a:p>
@@ -11250,8 +11443,8 @@
           </p:pic>
         </mc:Fallback>
       </mc:AlternateContent>
-      <mc:AlternateContent xmlns:mc="http://schemas.openxmlformats.org/markup-compatibility/2006">
-        <mc:Choice xmlns:p14="http://schemas.microsoft.com/office/powerpoint/2010/main" Requires="p14">
+      <mc:AlternateContent xmlns:mc="http://schemas.openxmlformats.org/markup-compatibility/2006" xmlns:p14="http://schemas.microsoft.com/office/powerpoint/2010/main">
+        <mc:Choice Requires="p14">
           <p:contentPart p14:bwMode="auto" r:id="rId142">
             <p14:nvContentPartPr>
               <p14:cNvPr id="55" name="Ink 54">
@@ -11270,7 +11463,7 @@
             </p14:xfrm>
           </p:contentPart>
         </mc:Choice>
-        <mc:Fallback>
+        <mc:Fallback xmlns="">
           <p:pic>
             <p:nvPicPr>
               <p:cNvPr id="55" name="Ink 54">
@@ -11301,8 +11494,8 @@
           </p:pic>
         </mc:Fallback>
       </mc:AlternateContent>
-      <mc:AlternateContent xmlns:mc="http://schemas.openxmlformats.org/markup-compatibility/2006">
-        <mc:Choice xmlns:p14="http://schemas.microsoft.com/office/powerpoint/2010/main" Requires="p14">
+      <mc:AlternateContent xmlns:mc="http://schemas.openxmlformats.org/markup-compatibility/2006" xmlns:p14="http://schemas.microsoft.com/office/powerpoint/2010/main">
+        <mc:Choice Requires="p14">
           <p:contentPart p14:bwMode="auto" r:id="rId144">
             <p14:nvContentPartPr>
               <p14:cNvPr id="56" name="Ink 55">
@@ -11321,7 +11514,7 @@
             </p14:xfrm>
           </p:contentPart>
         </mc:Choice>
-        <mc:Fallback>
+        <mc:Fallback xmlns="">
           <p:pic>
             <p:nvPicPr>
               <p:cNvPr id="56" name="Ink 55">
@@ -11352,8 +11545,8 @@
           </p:pic>
         </mc:Fallback>
       </mc:AlternateContent>
-      <mc:AlternateContent xmlns:mc="http://schemas.openxmlformats.org/markup-compatibility/2006">
-        <mc:Choice xmlns:p14="http://schemas.microsoft.com/office/powerpoint/2010/main" Requires="p14">
+      <mc:AlternateContent xmlns:mc="http://schemas.openxmlformats.org/markup-compatibility/2006" xmlns:p14="http://schemas.microsoft.com/office/powerpoint/2010/main">
+        <mc:Choice Requires="p14">
           <p:contentPart p14:bwMode="auto" r:id="rId145">
             <p14:nvContentPartPr>
               <p14:cNvPr id="57" name="Ink 56">
@@ -11372,7 +11565,7 @@
             </p14:xfrm>
           </p:contentPart>
         </mc:Choice>
-        <mc:Fallback>
+        <mc:Fallback xmlns="">
           <p:pic>
             <p:nvPicPr>
               <p:cNvPr id="57" name="Ink 56">
@@ -11403,8 +11596,8 @@
           </p:pic>
         </mc:Fallback>
       </mc:AlternateContent>
-      <mc:AlternateContent xmlns:mc="http://schemas.openxmlformats.org/markup-compatibility/2006">
-        <mc:Choice xmlns:p14="http://schemas.microsoft.com/office/powerpoint/2010/main" Requires="p14">
+      <mc:AlternateContent xmlns:mc="http://schemas.openxmlformats.org/markup-compatibility/2006" xmlns:p14="http://schemas.microsoft.com/office/powerpoint/2010/main">
+        <mc:Choice Requires="p14">
           <p:contentPart p14:bwMode="auto" r:id="rId146">
             <p14:nvContentPartPr>
               <p14:cNvPr id="58" name="Ink 57">
@@ -11423,7 +11616,7 @@
             </p14:xfrm>
           </p:contentPart>
         </mc:Choice>
-        <mc:Fallback>
+        <mc:Fallback xmlns="">
           <p:pic>
             <p:nvPicPr>
               <p:cNvPr id="58" name="Ink 57">
@@ -11454,8 +11647,8 @@
           </p:pic>
         </mc:Fallback>
       </mc:AlternateContent>
-      <mc:AlternateContent xmlns:mc="http://schemas.openxmlformats.org/markup-compatibility/2006">
-        <mc:Choice xmlns:p14="http://schemas.microsoft.com/office/powerpoint/2010/main" Requires="p14">
+      <mc:AlternateContent xmlns:mc="http://schemas.openxmlformats.org/markup-compatibility/2006" xmlns:p14="http://schemas.microsoft.com/office/powerpoint/2010/main">
+        <mc:Choice Requires="p14">
           <p:contentPart p14:bwMode="auto" r:id="rId147">
             <p14:nvContentPartPr>
               <p14:cNvPr id="59" name="Ink 58">
@@ -11474,7 +11667,7 @@
             </p14:xfrm>
           </p:contentPart>
         </mc:Choice>
-        <mc:Fallback>
+        <mc:Fallback xmlns="">
           <p:pic>
             <p:nvPicPr>
               <p:cNvPr id="59" name="Ink 58">
@@ -11505,8 +11698,8 @@
           </p:pic>
         </mc:Fallback>
       </mc:AlternateContent>
-      <mc:AlternateContent xmlns:mc="http://schemas.openxmlformats.org/markup-compatibility/2006">
-        <mc:Choice xmlns:p14="http://schemas.microsoft.com/office/powerpoint/2010/main" Requires="p14">
+      <mc:AlternateContent xmlns:mc="http://schemas.openxmlformats.org/markup-compatibility/2006" xmlns:p14="http://schemas.microsoft.com/office/powerpoint/2010/main">
+        <mc:Choice Requires="p14">
           <p:contentPart p14:bwMode="auto" r:id="rId148">
             <p14:nvContentPartPr>
               <p14:cNvPr id="60" name="Ink 59">
@@ -11525,7 +11718,7 @@
             </p14:xfrm>
           </p:contentPart>
         </mc:Choice>
-        <mc:Fallback>
+        <mc:Fallback xmlns="">
           <p:pic>
             <p:nvPicPr>
               <p:cNvPr id="60" name="Ink 59">
@@ -11556,8 +11749,8 @@
           </p:pic>
         </mc:Fallback>
       </mc:AlternateContent>
-      <mc:AlternateContent xmlns:mc="http://schemas.openxmlformats.org/markup-compatibility/2006">
-        <mc:Choice xmlns:p14="http://schemas.microsoft.com/office/powerpoint/2010/main" Requires="p14">
+      <mc:AlternateContent xmlns:mc="http://schemas.openxmlformats.org/markup-compatibility/2006" xmlns:p14="http://schemas.microsoft.com/office/powerpoint/2010/main">
+        <mc:Choice Requires="p14">
           <p:contentPart p14:bwMode="auto" r:id="rId149">
             <p14:nvContentPartPr>
               <p14:cNvPr id="67" name="Ink 66">
@@ -11576,7 +11769,7 @@
             </p14:xfrm>
           </p:contentPart>
         </mc:Choice>
-        <mc:Fallback>
+        <mc:Fallback xmlns="">
           <p:pic>
             <p:nvPicPr>
               <p:cNvPr id="67" name="Ink 66">
@@ -13558,8 +13751,8 @@
           </p:pic>
         </mc:Fallback>
       </mc:AlternateContent>
-      <mc:AlternateContent xmlns:mc="http://schemas.openxmlformats.org/markup-compatibility/2006">
-        <mc:Choice xmlns:a14="http://schemas.microsoft.com/office/drawing/2010/main" Requires="a14">
+      <mc:AlternateContent xmlns:mc="http://schemas.openxmlformats.org/markup-compatibility/2006" xmlns:a14="http://schemas.microsoft.com/office/drawing/2010/main">
+        <mc:Choice Requires="a14">
           <p:sp>
             <p:nvSpPr>
               <p:cNvPr id="23" name="TextBox 22">
@@ -13657,7 +13850,7 @@
             </p:txBody>
           </p:sp>
         </mc:Choice>
-        <mc:Fallback>
+        <mc:Fallback xmlns="">
           <p:sp>
             <p:nvSpPr>
               <p:cNvPr id="23" name="TextBox 22">
@@ -13702,8 +13895,8 @@
           </p:sp>
         </mc:Fallback>
       </mc:AlternateContent>
-      <mc:AlternateContent xmlns:mc="http://schemas.openxmlformats.org/markup-compatibility/2006">
-        <mc:Choice xmlns:a14="http://schemas.microsoft.com/office/drawing/2010/main" Requires="a14">
+      <mc:AlternateContent xmlns:mc="http://schemas.openxmlformats.org/markup-compatibility/2006" xmlns:a14="http://schemas.microsoft.com/office/drawing/2010/main">
+        <mc:Choice Requires="a14">
           <p:sp>
             <p:nvSpPr>
               <p:cNvPr id="24" name="TextBox 23">
@@ -13801,7 +13994,7 @@
             </p:txBody>
           </p:sp>
         </mc:Choice>
-        <mc:Fallback>
+        <mc:Fallback xmlns="">
           <p:sp>
             <p:nvSpPr>
               <p:cNvPr id="24" name="TextBox 23">
@@ -13846,8 +14039,8 @@
           </p:sp>
         </mc:Fallback>
       </mc:AlternateContent>
-      <mc:AlternateContent xmlns:mc="http://schemas.openxmlformats.org/markup-compatibility/2006">
-        <mc:Choice xmlns:a14="http://schemas.microsoft.com/office/drawing/2010/main" Requires="a14">
+      <mc:AlternateContent xmlns:mc="http://schemas.openxmlformats.org/markup-compatibility/2006" xmlns:a14="http://schemas.microsoft.com/office/drawing/2010/main">
+        <mc:Choice Requires="a14">
           <p:sp>
             <p:nvSpPr>
               <p:cNvPr id="25" name="TextBox 24">
@@ -14057,7 +14250,7 @@
             </p:txBody>
           </p:sp>
         </mc:Choice>
-        <mc:Fallback>
+        <mc:Fallback xmlns="">
           <p:sp>
             <p:nvSpPr>
               <p:cNvPr id="25" name="TextBox 24">
@@ -14345,6 +14538,1098 @@
 </file>
 
 <file path=ppt/slides/slide4.xml><?xml version="1.0" encoding="utf-8"?>
+<p:sld xmlns:a="http://schemas.openxmlformats.org/drawingml/2006/main" xmlns:r="http://schemas.openxmlformats.org/officeDocument/2006/relationships" xmlns:p="http://schemas.openxmlformats.org/presentationml/2006/main">
+  <p:cSld>
+    <p:spTree>
+      <p:nvGrpSpPr>
+        <p:cNvPr id="1" name="">
+          <a:extLst>
+            <a:ext uri="{FF2B5EF4-FFF2-40B4-BE49-F238E27FC236}">
+              <a16:creationId xmlns:a16="http://schemas.microsoft.com/office/drawing/2014/main" id="{55B77E6F-E9C3-0FCD-4A16-9160A3B7EB46}"/>
+            </a:ext>
+          </a:extLst>
+        </p:cNvPr>
+        <p:cNvGrpSpPr/>
+        <p:nvPr/>
+      </p:nvGrpSpPr>
+      <p:grpSpPr>
+        <a:xfrm>
+          <a:off x="0" y="0"/>
+          <a:ext cx="0" cy="0"/>
+          <a:chOff x="0" y="0"/>
+          <a:chExt cx="0" cy="0"/>
+        </a:xfrm>
+      </p:grpSpPr>
+      <p:pic>
+        <p:nvPicPr>
+          <p:cNvPr id="7" name="Picture 6" descr="A graph of negative outcome&#10;&#10;Description automatically generated">
+            <a:extLst>
+              <a:ext uri="{FF2B5EF4-FFF2-40B4-BE49-F238E27FC236}">
+                <a16:creationId xmlns:a16="http://schemas.microsoft.com/office/drawing/2014/main" id="{74EE9002-36B9-54C5-9973-1F1EA598FDFA}"/>
+              </a:ext>
+            </a:extLst>
+          </p:cNvPr>
+          <p:cNvPicPr>
+            <a:picLocks noChangeAspect="1"/>
+          </p:cNvPicPr>
+          <p:nvPr/>
+        </p:nvPicPr>
+        <p:blipFill rotWithShape="1">
+          <a:blip r:embed="rId2"/>
+          <a:srcRect r="24519"/>
+          <a:stretch/>
+        </p:blipFill>
+        <p:spPr>
+          <a:xfrm>
+            <a:off x="2640903" y="1279210"/>
+            <a:ext cx="6240338" cy="4133719"/>
+          </a:xfrm>
+          <a:prstGeom prst="rect">
+            <a:avLst/>
+          </a:prstGeom>
+        </p:spPr>
+      </p:pic>
+      <p:grpSp>
+        <p:nvGrpSpPr>
+          <p:cNvPr id="22" name="Group 21">
+            <a:extLst>
+              <a:ext uri="{FF2B5EF4-FFF2-40B4-BE49-F238E27FC236}">
+                <a16:creationId xmlns:a16="http://schemas.microsoft.com/office/drawing/2014/main" id="{E4F4D146-C24A-C125-1370-BDD9F4D076EF}"/>
+              </a:ext>
+            </a:extLst>
+          </p:cNvPr>
+          <p:cNvGrpSpPr/>
+          <p:nvPr/>
+        </p:nvGrpSpPr>
+        <p:grpSpPr>
+          <a:xfrm>
+            <a:off x="5557922" y="1539051"/>
+            <a:ext cx="289080" cy="2874960"/>
+            <a:chOff x="5470834" y="1539051"/>
+            <a:chExt cx="289080" cy="2874960"/>
+          </a:xfrm>
+        </p:grpSpPr>
+        <mc:AlternateContent xmlns:mc="http://schemas.openxmlformats.org/markup-compatibility/2006">
+          <mc:Choice xmlns:p14="http://schemas.microsoft.com/office/powerpoint/2010/main" Requires="p14">
+            <p:contentPart p14:bwMode="auto" r:id="rId3">
+              <p14:nvContentPartPr>
+                <p14:cNvPr id="14" name="Ink 13">
+                  <a:extLst>
+                    <a:ext uri="{FF2B5EF4-FFF2-40B4-BE49-F238E27FC236}">
+                      <a16:creationId xmlns:a16="http://schemas.microsoft.com/office/drawing/2014/main" id="{11099E06-CE62-B58B-046A-77CF18D23E76}"/>
+                    </a:ext>
+                  </a:extLst>
+                </p14:cNvPr>
+                <p14:cNvContentPartPr/>
+                <p14:nvPr/>
+              </p14:nvContentPartPr>
+              <p14:xfrm>
+                <a:off x="5470834" y="1539051"/>
+                <a:ext cx="243720" cy="23400"/>
+              </p14:xfrm>
+            </p:contentPart>
+          </mc:Choice>
+          <mc:Fallback>
+            <p:pic>
+              <p:nvPicPr>
+                <p:cNvPr id="14" name="Ink 13">
+                  <a:extLst>
+                    <a:ext uri="{FF2B5EF4-FFF2-40B4-BE49-F238E27FC236}">
+                      <a16:creationId xmlns:a16="http://schemas.microsoft.com/office/drawing/2014/main" id="{11099E06-CE62-B58B-046A-77CF18D23E76}"/>
+                    </a:ext>
+                  </a:extLst>
+                </p:cNvPr>
+                <p:cNvPicPr/>
+                <p:nvPr/>
+              </p:nvPicPr>
+              <p:blipFill>
+                <a:blip r:embed="rId4"/>
+                <a:stretch>
+                  <a:fillRect/>
+                </a:stretch>
+              </p:blipFill>
+              <p:spPr>
+                <a:xfrm>
+                  <a:off x="5452807" y="1521051"/>
+                  <a:ext cx="279413" cy="59040"/>
+                </a:xfrm>
+                <a:prstGeom prst="rect">
+                  <a:avLst/>
+                </a:prstGeom>
+              </p:spPr>
+            </p:pic>
+          </mc:Fallback>
+        </mc:AlternateContent>
+        <mc:AlternateContent xmlns:mc="http://schemas.openxmlformats.org/markup-compatibility/2006">
+          <mc:Choice xmlns:p14="http://schemas.microsoft.com/office/powerpoint/2010/main" Requires="p14">
+            <p:contentPart p14:bwMode="auto" r:id="rId5">
+              <p14:nvContentPartPr>
+                <p14:cNvPr id="15" name="Ink 14">
+                  <a:extLst>
+                    <a:ext uri="{FF2B5EF4-FFF2-40B4-BE49-F238E27FC236}">
+                      <a16:creationId xmlns:a16="http://schemas.microsoft.com/office/drawing/2014/main" id="{6FF2367B-E1E7-BF16-3F6D-69F0E837A850}"/>
+                    </a:ext>
+                  </a:extLst>
+                </p14:cNvPr>
+                <p14:cNvContentPartPr/>
+                <p14:nvPr/>
+              </p14:nvContentPartPr>
+              <p14:xfrm>
+                <a:off x="5504674" y="1562091"/>
+                <a:ext cx="255240" cy="2851920"/>
+              </p14:xfrm>
+            </p:contentPart>
+          </mc:Choice>
+          <mc:Fallback>
+            <p:pic>
+              <p:nvPicPr>
+                <p:cNvPr id="15" name="Ink 14">
+                  <a:extLst>
+                    <a:ext uri="{FF2B5EF4-FFF2-40B4-BE49-F238E27FC236}">
+                      <a16:creationId xmlns:a16="http://schemas.microsoft.com/office/drawing/2014/main" id="{6FF2367B-E1E7-BF16-3F6D-69F0E837A850}"/>
+                    </a:ext>
+                  </a:extLst>
+                </p:cNvPr>
+                <p:cNvPicPr/>
+                <p:nvPr/>
+              </p:nvPicPr>
+              <p:blipFill>
+                <a:blip r:embed="rId6"/>
+                <a:stretch>
+                  <a:fillRect/>
+                </a:stretch>
+              </p:blipFill>
+              <p:spPr>
+                <a:xfrm>
+                  <a:off x="5486674" y="1544091"/>
+                  <a:ext cx="290880" cy="2887560"/>
+                </a:xfrm>
+                <a:prstGeom prst="rect">
+                  <a:avLst/>
+                </a:prstGeom>
+              </p:spPr>
+            </p:pic>
+          </mc:Fallback>
+        </mc:AlternateContent>
+      </p:grpSp>
+      <mc:AlternateContent xmlns:mc="http://schemas.openxmlformats.org/markup-compatibility/2006">
+        <mc:Choice xmlns:p14="http://schemas.microsoft.com/office/powerpoint/2010/main" Requires="p14">
+          <p:contentPart p14:bwMode="auto" r:id="rId7">
+            <p14:nvContentPartPr>
+              <p14:cNvPr id="16" name="Ink 15">
+                <a:extLst>
+                  <a:ext uri="{FF2B5EF4-FFF2-40B4-BE49-F238E27FC236}">
+                    <a16:creationId xmlns:a16="http://schemas.microsoft.com/office/drawing/2014/main" id="{8A3143B7-BD80-6B4B-D86A-58605803A7FC}"/>
+                  </a:ext>
+                </a:extLst>
+              </p14:cNvPr>
+              <p14:cNvContentPartPr/>
+              <p14:nvPr/>
+            </p14:nvContentPartPr>
+            <p14:xfrm>
+              <a:off x="7337168" y="1569398"/>
+              <a:ext cx="275832" cy="753387"/>
+            </p14:xfrm>
+          </p:contentPart>
+        </mc:Choice>
+        <mc:Fallback>
+          <p:pic>
+            <p:nvPicPr>
+              <p:cNvPr id="16" name="Ink 15">
+                <a:extLst>
+                  <a:ext uri="{FF2B5EF4-FFF2-40B4-BE49-F238E27FC236}">
+                    <a16:creationId xmlns:a16="http://schemas.microsoft.com/office/drawing/2014/main" id="{8A3143B7-BD80-6B4B-D86A-58605803A7FC}"/>
+                  </a:ext>
+                </a:extLst>
+              </p:cNvPr>
+              <p:cNvPicPr/>
+              <p:nvPr/>
+            </p:nvPicPr>
+            <p:blipFill>
+              <a:blip r:embed="rId8"/>
+              <a:stretch>
+                <a:fillRect/>
+              </a:stretch>
+            </p:blipFill>
+            <p:spPr>
+              <a:xfrm>
+                <a:off x="7319140" y="1551400"/>
+                <a:ext cx="311528" cy="789023"/>
+              </a:xfrm>
+              <a:prstGeom prst="rect">
+                <a:avLst/>
+              </a:prstGeom>
+            </p:spPr>
+          </p:pic>
+        </mc:Fallback>
+      </mc:AlternateContent>
+      <mc:AlternateContent xmlns:mc="http://schemas.openxmlformats.org/markup-compatibility/2006">
+        <mc:Choice xmlns:p14="http://schemas.microsoft.com/office/powerpoint/2010/main" Requires="p14">
+          <p:contentPart p14:bwMode="auto" r:id="rId9">
+            <p14:nvContentPartPr>
+              <p14:cNvPr id="20" name="Ink 19">
+                <a:extLst>
+                  <a:ext uri="{FF2B5EF4-FFF2-40B4-BE49-F238E27FC236}">
+                    <a16:creationId xmlns:a16="http://schemas.microsoft.com/office/drawing/2014/main" id="{75CB6DEB-0D98-D94D-9E29-08FA57E11AA1}"/>
+                  </a:ext>
+                </a:extLst>
+              </p14:cNvPr>
+              <p14:cNvContentPartPr/>
+              <p14:nvPr/>
+            </p14:nvContentPartPr>
+            <p14:xfrm>
+              <a:off x="8063506" y="2308140"/>
+              <a:ext cx="401760" cy="2190288"/>
+            </p14:xfrm>
+          </p:contentPart>
+        </mc:Choice>
+        <mc:Fallback>
+          <p:pic>
+            <p:nvPicPr>
+              <p:cNvPr id="20" name="Ink 19">
+                <a:extLst>
+                  <a:ext uri="{FF2B5EF4-FFF2-40B4-BE49-F238E27FC236}">
+                    <a16:creationId xmlns:a16="http://schemas.microsoft.com/office/drawing/2014/main" id="{75CB6DEB-0D98-D94D-9E29-08FA57E11AA1}"/>
+                  </a:ext>
+                </a:extLst>
+              </p:cNvPr>
+              <p:cNvPicPr/>
+              <p:nvPr/>
+            </p:nvPicPr>
+            <p:blipFill>
+              <a:blip r:embed="rId10"/>
+              <a:stretch>
+                <a:fillRect/>
+              </a:stretch>
+            </p:blipFill>
+            <p:spPr>
+              <a:xfrm>
+                <a:off x="8045506" y="2290140"/>
+                <a:ext cx="437400" cy="2225929"/>
+              </a:xfrm>
+              <a:prstGeom prst="rect">
+                <a:avLst/>
+              </a:prstGeom>
+            </p:spPr>
+          </p:pic>
+        </mc:Fallback>
+      </mc:AlternateContent>
+      <mc:AlternateContent xmlns:mc="http://schemas.openxmlformats.org/markup-compatibility/2006">
+        <mc:Choice xmlns:a14="http://schemas.microsoft.com/office/drawing/2010/main" Requires="a14">
+          <p:sp>
+            <p:nvSpPr>
+              <p:cNvPr id="23" name="TextBox 22">
+                <a:extLst>
+                  <a:ext uri="{FF2B5EF4-FFF2-40B4-BE49-F238E27FC236}">
+                    <a16:creationId xmlns:a16="http://schemas.microsoft.com/office/drawing/2014/main" id="{41F269A9-A859-2D65-E3D3-E5D2E02EBD5F}"/>
+                  </a:ext>
+                </a:extLst>
+              </p:cNvPr>
+              <p:cNvSpPr txBox="1"/>
+              <p:nvPr/>
+            </p:nvSpPr>
+            <p:spPr>
+              <a:xfrm>
+                <a:off x="5461044" y="2693056"/>
+                <a:ext cx="768415" cy="381515"/>
+              </a:xfrm>
+              <a:prstGeom prst="rect">
+                <a:avLst/>
+              </a:prstGeom>
+              <a:solidFill>
+                <a:schemeClr val="bg1"/>
+              </a:solidFill>
+            </p:spPr>
+            <p:txBody>
+              <a:bodyPr wrap="none" rtlCol="0">
+                <a:spAutoFit/>
+              </a:bodyPr>
+              <a:lstStyle/>
+              <a:p>
+                <a:pPr/>
+                <a14:m>
+                  <m:oMathPara xmlns:m="http://schemas.openxmlformats.org/officeDocument/2006/math">
+                    <m:oMathParaPr>
+                      <m:jc m:val="centerGroup"/>
+                    </m:oMathParaPr>
+                    <m:oMath xmlns:m="http://schemas.openxmlformats.org/officeDocument/2006/math">
+                      <m:sSub>
+                        <m:sSubPr>
+                          <m:ctrlPr>
+                            <a:rPr lang="en-US" i="1" smtClean="0">
+                              <a:latin typeface="Cambria Math" panose="02040503050406030204" pitchFamily="18" charset="0"/>
+                              <a:ea typeface="Cambria Math" panose="02040503050406030204" pitchFamily="18" charset="0"/>
+                            </a:rPr>
+                          </m:ctrlPr>
+                        </m:sSubPr>
+                        <m:e>
+                          <m:r>
+                            <a:rPr lang="en-US" i="1">
+                              <a:latin typeface="Cambria Math" panose="02040503050406030204" pitchFamily="18" charset="0"/>
+                              <a:ea typeface="Cambria Math" panose="02040503050406030204" pitchFamily="18" charset="0"/>
+                            </a:rPr>
+                            <m:t>𝛽</m:t>
+                          </m:r>
+                        </m:e>
+                        <m:sub>
+                          <m:r>
+                            <a:rPr lang="en-US" i="1">
+                              <a:latin typeface="Cambria Math" panose="02040503050406030204" pitchFamily="18" charset="0"/>
+                              <a:ea typeface="Cambria Math" panose="02040503050406030204" pitchFamily="18" charset="0"/>
+                            </a:rPr>
+                            <m:t>−</m:t>
+                          </m:r>
+                          <m:r>
+                            <a:rPr lang="en-US" i="1">
+                              <a:latin typeface="Cambria Math" panose="02040503050406030204" pitchFamily="18" charset="0"/>
+                              <a:ea typeface="Cambria Math" panose="02040503050406030204" pitchFamily="18" charset="0"/>
+                            </a:rPr>
+                            <m:t>𝐵</m:t>
+                          </m:r>
+                          <m:r>
+                            <a:rPr lang="en-US" i="1">
+                              <a:latin typeface="Cambria Math" panose="02040503050406030204" pitchFamily="18" charset="0"/>
+                              <a:ea typeface="Cambria Math" panose="02040503050406030204" pitchFamily="18" charset="0"/>
+                            </a:rPr>
+                            <m:t>,</m:t>
+                          </m:r>
+                          <m:r>
+                            <a:rPr lang="en-US" i="1">
+                              <a:latin typeface="Cambria Math" panose="02040503050406030204" pitchFamily="18" charset="0"/>
+                              <a:ea typeface="Cambria Math" panose="02040503050406030204" pitchFamily="18" charset="0"/>
+                            </a:rPr>
+                            <m:t>𝑂</m:t>
+                          </m:r>
+                        </m:sub>
+                      </m:sSub>
+                    </m:oMath>
+                  </m:oMathPara>
+                </a14:m>
+                <a:endParaRPr lang="en-US" dirty="0">
+                  <a:latin typeface="Source Sans Pro" panose="020B0503030403020204" pitchFamily="34" charset="0"/>
+                  <a:ea typeface="Source Sans Pro" panose="020B0503030403020204" pitchFamily="34" charset="0"/>
+                </a:endParaRPr>
+              </a:p>
+            </p:txBody>
+          </p:sp>
+        </mc:Choice>
+        <mc:Fallback>
+          <p:sp>
+            <p:nvSpPr>
+              <p:cNvPr id="23" name="TextBox 22">
+                <a:extLst>
+                  <a:ext uri="{FF2B5EF4-FFF2-40B4-BE49-F238E27FC236}">
+                    <a16:creationId xmlns:a16="http://schemas.microsoft.com/office/drawing/2014/main" id="{41F269A9-A859-2D65-E3D3-E5D2E02EBD5F}"/>
+                  </a:ext>
+                </a:extLst>
+              </p:cNvPr>
+              <p:cNvSpPr txBox="1">
+                <a:spLocks noRot="1" noChangeAspect="1" noMove="1" noResize="1" noEditPoints="1" noAdjustHandles="1" noChangeArrowheads="1" noChangeShapeType="1" noTextEdit="1"/>
+              </p:cNvSpPr>
+              <p:nvPr/>
+            </p:nvSpPr>
+            <p:spPr>
+              <a:xfrm>
+                <a:off x="5461044" y="2693056"/>
+                <a:ext cx="768415" cy="381515"/>
+              </a:xfrm>
+              <a:prstGeom prst="rect">
+                <a:avLst/>
+              </a:prstGeom>
+              <a:blipFill>
+                <a:blip r:embed="rId11"/>
+                <a:stretch>
+                  <a:fillRect b="-13333"/>
+                </a:stretch>
+              </a:blipFill>
+            </p:spPr>
+            <p:txBody>
+              <a:bodyPr/>
+              <a:lstStyle/>
+              <a:p>
+                <a:r>
+                  <a:rPr lang="en-US">
+                    <a:noFill/>
+                  </a:rPr>
+                  <a:t> </a:t>
+                </a:r>
+              </a:p>
+            </p:txBody>
+          </p:sp>
+        </mc:Fallback>
+      </mc:AlternateContent>
+      <mc:AlternateContent xmlns:mc="http://schemas.openxmlformats.org/markup-compatibility/2006">
+        <mc:Choice xmlns:a14="http://schemas.microsoft.com/office/drawing/2010/main" Requires="a14">
+          <p:sp>
+            <p:nvSpPr>
+              <p:cNvPr id="24" name="TextBox 23">
+                <a:extLst>
+                  <a:ext uri="{FF2B5EF4-FFF2-40B4-BE49-F238E27FC236}">
+                    <a16:creationId xmlns:a16="http://schemas.microsoft.com/office/drawing/2014/main" id="{82C399CB-2207-3808-419B-8BFBE0DD227F}"/>
+                  </a:ext>
+                </a:extLst>
+              </p:cNvPr>
+              <p:cNvSpPr txBox="1"/>
+              <p:nvPr/>
+            </p:nvSpPr>
+            <p:spPr>
+              <a:xfrm>
+                <a:off x="7203520" y="1715566"/>
+                <a:ext cx="768415" cy="381515"/>
+              </a:xfrm>
+              <a:prstGeom prst="rect">
+                <a:avLst/>
+              </a:prstGeom>
+              <a:solidFill>
+                <a:schemeClr val="bg1"/>
+              </a:solidFill>
+            </p:spPr>
+            <p:txBody>
+              <a:bodyPr wrap="none" rtlCol="0">
+                <a:spAutoFit/>
+              </a:bodyPr>
+              <a:lstStyle/>
+              <a:p>
+                <a:pPr/>
+                <a14:m>
+                  <m:oMathPara xmlns:m="http://schemas.openxmlformats.org/officeDocument/2006/math">
+                    <m:oMathParaPr>
+                      <m:jc m:val="centerGroup"/>
+                    </m:oMathParaPr>
+                    <m:oMath xmlns:m="http://schemas.openxmlformats.org/officeDocument/2006/math">
+                      <m:sSub>
+                        <m:sSubPr>
+                          <m:ctrlPr>
+                            <a:rPr lang="en-US" i="1" smtClean="0">
+                              <a:latin typeface="Cambria Math" panose="02040503050406030204" pitchFamily="18" charset="0"/>
+                              <a:ea typeface="Cambria Math" panose="02040503050406030204" pitchFamily="18" charset="0"/>
+                            </a:rPr>
+                          </m:ctrlPr>
+                        </m:sSubPr>
+                        <m:e>
+                          <m:r>
+                            <a:rPr lang="en-US" i="1">
+                              <a:latin typeface="Cambria Math" panose="02040503050406030204" pitchFamily="18" charset="0"/>
+                              <a:ea typeface="Cambria Math" panose="02040503050406030204" pitchFamily="18" charset="0"/>
+                            </a:rPr>
+                            <m:t>𝛽</m:t>
+                          </m:r>
+                        </m:e>
+                        <m:sub>
+                          <m:r>
+                            <a:rPr lang="en-US" b="0" i="1" smtClean="0">
+                              <a:latin typeface="Cambria Math" panose="02040503050406030204" pitchFamily="18" charset="0"/>
+                              <a:ea typeface="Cambria Math" panose="02040503050406030204" pitchFamily="18" charset="0"/>
+                            </a:rPr>
+                            <m:t>𝐵</m:t>
+                          </m:r>
+                          <m:r>
+                            <a:rPr lang="en-US" i="1">
+                              <a:latin typeface="Cambria Math" panose="02040503050406030204" pitchFamily="18" charset="0"/>
+                              <a:ea typeface="Cambria Math" panose="02040503050406030204" pitchFamily="18" charset="0"/>
+                            </a:rPr>
+                            <m:t>,</m:t>
+                          </m:r>
+                          <m:r>
+                            <a:rPr lang="en-US" b="0" i="1" smtClean="0">
+                              <a:latin typeface="Cambria Math" panose="02040503050406030204" pitchFamily="18" charset="0"/>
+                              <a:ea typeface="Cambria Math" panose="02040503050406030204" pitchFamily="18" charset="0"/>
+                            </a:rPr>
+                            <m:t>−</m:t>
+                          </m:r>
+                          <m:r>
+                            <a:rPr lang="en-US" i="1">
+                              <a:latin typeface="Cambria Math" panose="02040503050406030204" pitchFamily="18" charset="0"/>
+                              <a:ea typeface="Cambria Math" panose="02040503050406030204" pitchFamily="18" charset="0"/>
+                            </a:rPr>
+                            <m:t>𝑂</m:t>
+                          </m:r>
+                        </m:sub>
+                      </m:sSub>
+                    </m:oMath>
+                  </m:oMathPara>
+                </a14:m>
+                <a:endParaRPr lang="en-US" dirty="0">
+                  <a:latin typeface="Source Sans Pro" panose="020B0503030403020204" pitchFamily="34" charset="0"/>
+                  <a:ea typeface="Source Sans Pro" panose="020B0503030403020204" pitchFamily="34" charset="0"/>
+                </a:endParaRPr>
+              </a:p>
+            </p:txBody>
+          </p:sp>
+        </mc:Choice>
+        <mc:Fallback>
+          <p:sp>
+            <p:nvSpPr>
+              <p:cNvPr id="24" name="TextBox 23">
+                <a:extLst>
+                  <a:ext uri="{FF2B5EF4-FFF2-40B4-BE49-F238E27FC236}">
+                    <a16:creationId xmlns:a16="http://schemas.microsoft.com/office/drawing/2014/main" id="{82C399CB-2207-3808-419B-8BFBE0DD227F}"/>
+                  </a:ext>
+                </a:extLst>
+              </p:cNvPr>
+              <p:cNvSpPr txBox="1">
+                <a:spLocks noRot="1" noChangeAspect="1" noMove="1" noResize="1" noEditPoints="1" noAdjustHandles="1" noChangeArrowheads="1" noChangeShapeType="1" noTextEdit="1"/>
+              </p:cNvSpPr>
+              <p:nvPr/>
+            </p:nvSpPr>
+            <p:spPr>
+              <a:xfrm>
+                <a:off x="7203520" y="1715566"/>
+                <a:ext cx="768415" cy="381515"/>
+              </a:xfrm>
+              <a:prstGeom prst="rect">
+                <a:avLst/>
+              </a:prstGeom>
+              <a:blipFill>
+                <a:blip r:embed="rId12"/>
+                <a:stretch>
+                  <a:fillRect b="-9375"/>
+                </a:stretch>
+              </a:blipFill>
+            </p:spPr>
+            <p:txBody>
+              <a:bodyPr/>
+              <a:lstStyle/>
+              <a:p>
+                <a:r>
+                  <a:rPr lang="en-US">
+                    <a:noFill/>
+                  </a:rPr>
+                  <a:t> </a:t>
+                </a:r>
+              </a:p>
+            </p:txBody>
+          </p:sp>
+        </mc:Fallback>
+      </mc:AlternateContent>
+      <mc:AlternateContent xmlns:mc="http://schemas.openxmlformats.org/markup-compatibility/2006">
+        <mc:Choice xmlns:a14="http://schemas.microsoft.com/office/drawing/2010/main" Requires="a14">
+          <p:sp>
+            <p:nvSpPr>
+              <p:cNvPr id="25" name="TextBox 24">
+                <a:extLst>
+                  <a:ext uri="{FF2B5EF4-FFF2-40B4-BE49-F238E27FC236}">
+                    <a16:creationId xmlns:a16="http://schemas.microsoft.com/office/drawing/2014/main" id="{1143C91C-755A-6E77-52AA-5DD49051DAD7}"/>
+                  </a:ext>
+                </a:extLst>
+              </p:cNvPr>
+              <p:cNvSpPr txBox="1"/>
+              <p:nvPr/>
+            </p:nvSpPr>
+            <p:spPr>
+              <a:xfrm>
+                <a:off x="7543463" y="3155313"/>
+                <a:ext cx="2503378" cy="381515"/>
+              </a:xfrm>
+              <a:prstGeom prst="rect">
+                <a:avLst/>
+              </a:prstGeom>
+              <a:solidFill>
+                <a:schemeClr val="bg1"/>
+              </a:solidFill>
+            </p:spPr>
+            <p:txBody>
+              <a:bodyPr wrap="none" rtlCol="0">
+                <a:spAutoFit/>
+              </a:bodyPr>
+              <a:lstStyle/>
+              <a:p>
+                <a:pPr/>
+                <a14:m>
+                  <m:oMathPara xmlns:m="http://schemas.openxmlformats.org/officeDocument/2006/math">
+                    <m:oMathParaPr>
+                      <m:jc m:val="centerGroup"/>
+                    </m:oMathParaPr>
+                    <m:oMath xmlns:m="http://schemas.openxmlformats.org/officeDocument/2006/math">
+                      <m:sSub>
+                        <m:sSubPr>
+                          <m:ctrlPr>
+                            <a:rPr lang="en-US" i="1" smtClean="0">
+                              <a:latin typeface="Cambria Math" panose="02040503050406030204" pitchFamily="18" charset="0"/>
+                              <a:ea typeface="Cambria Math" panose="02040503050406030204" pitchFamily="18" charset="0"/>
+                            </a:rPr>
+                          </m:ctrlPr>
+                        </m:sSubPr>
+                        <m:e>
+                          <m:sSub>
+                            <m:sSubPr>
+                              <m:ctrlPr>
+                                <a:rPr lang="en-US" i="1">
+                                  <a:latin typeface="Cambria Math" panose="02040503050406030204" pitchFamily="18" charset="0"/>
+                                  <a:ea typeface="Cambria Math" panose="02040503050406030204" pitchFamily="18" charset="0"/>
+                                </a:rPr>
+                              </m:ctrlPr>
+                            </m:sSubPr>
+                            <m:e>
+                              <m:r>
+                                <a:rPr lang="en-US" i="1">
+                                  <a:latin typeface="Cambria Math" panose="02040503050406030204" pitchFamily="18" charset="0"/>
+                                  <a:ea typeface="Cambria Math" panose="02040503050406030204" pitchFamily="18" charset="0"/>
+                                </a:rPr>
+                                <m:t>𝛽</m:t>
+                              </m:r>
+                            </m:e>
+                            <m:sub>
+                              <m:r>
+                                <a:rPr lang="en-US" i="1">
+                                  <a:latin typeface="Cambria Math" panose="02040503050406030204" pitchFamily="18" charset="0"/>
+                                  <a:ea typeface="Cambria Math" panose="02040503050406030204" pitchFamily="18" charset="0"/>
+                                </a:rPr>
+                                <m:t>−</m:t>
+                              </m:r>
+                              <m:r>
+                                <a:rPr lang="en-US" i="1">
+                                  <a:latin typeface="Cambria Math" panose="02040503050406030204" pitchFamily="18" charset="0"/>
+                                  <a:ea typeface="Cambria Math" panose="02040503050406030204" pitchFamily="18" charset="0"/>
+                                </a:rPr>
+                                <m:t>𝐵</m:t>
+                              </m:r>
+                              <m:r>
+                                <a:rPr lang="en-US" i="1">
+                                  <a:latin typeface="Cambria Math" panose="02040503050406030204" pitchFamily="18" charset="0"/>
+                                  <a:ea typeface="Cambria Math" panose="02040503050406030204" pitchFamily="18" charset="0"/>
+                                </a:rPr>
+                                <m:t>,</m:t>
+                              </m:r>
+                              <m:r>
+                                <a:rPr lang="en-US" i="1">
+                                  <a:latin typeface="Cambria Math" panose="02040503050406030204" pitchFamily="18" charset="0"/>
+                                  <a:ea typeface="Cambria Math" panose="02040503050406030204" pitchFamily="18" charset="0"/>
+                                </a:rPr>
+                                <m:t>𝑂</m:t>
+                              </m:r>
+                            </m:sub>
+                          </m:sSub>
+                          <m:r>
+                            <a:rPr lang="en-US" b="0" i="1" smtClean="0">
+                              <a:latin typeface="Cambria Math" panose="02040503050406030204" pitchFamily="18" charset="0"/>
+                              <a:ea typeface="Cambria Math" panose="02040503050406030204" pitchFamily="18" charset="0"/>
+                            </a:rPr>
+                            <m:t>+</m:t>
+                          </m:r>
+                          <m:sSub>
+                            <m:sSubPr>
+                              <m:ctrlPr>
+                                <a:rPr lang="en-US" i="1">
+                                  <a:latin typeface="Cambria Math" panose="02040503050406030204" pitchFamily="18" charset="0"/>
+                                  <a:ea typeface="Cambria Math" panose="02040503050406030204" pitchFamily="18" charset="0"/>
+                                </a:rPr>
+                              </m:ctrlPr>
+                            </m:sSubPr>
+                            <m:e>
+                              <m:r>
+                                <a:rPr lang="en-US" i="1">
+                                  <a:latin typeface="Cambria Math" panose="02040503050406030204" pitchFamily="18" charset="0"/>
+                                  <a:ea typeface="Cambria Math" panose="02040503050406030204" pitchFamily="18" charset="0"/>
+                                </a:rPr>
+                                <m:t>𝛽</m:t>
+                              </m:r>
+                            </m:e>
+                            <m:sub>
+                              <m:r>
+                                <a:rPr lang="en-US" i="1">
+                                  <a:latin typeface="Cambria Math" panose="02040503050406030204" pitchFamily="18" charset="0"/>
+                                  <a:ea typeface="Cambria Math" panose="02040503050406030204" pitchFamily="18" charset="0"/>
+                                </a:rPr>
+                                <m:t>𝐵</m:t>
+                              </m:r>
+                              <m:r>
+                                <a:rPr lang="en-US" i="1">
+                                  <a:latin typeface="Cambria Math" panose="02040503050406030204" pitchFamily="18" charset="0"/>
+                                  <a:ea typeface="Cambria Math" panose="02040503050406030204" pitchFamily="18" charset="0"/>
+                                </a:rPr>
+                                <m:t>,−</m:t>
+                              </m:r>
+                              <m:r>
+                                <a:rPr lang="en-US" i="1">
+                                  <a:latin typeface="Cambria Math" panose="02040503050406030204" pitchFamily="18" charset="0"/>
+                                  <a:ea typeface="Cambria Math" panose="02040503050406030204" pitchFamily="18" charset="0"/>
+                                </a:rPr>
+                                <m:t>𝑂</m:t>
+                              </m:r>
+                            </m:sub>
+                          </m:sSub>
+                          <m:r>
+                            <a:rPr lang="en-US" b="0" i="1" smtClean="0">
+                              <a:latin typeface="Cambria Math" panose="02040503050406030204" pitchFamily="18" charset="0"/>
+                              <a:ea typeface="Cambria Math" panose="02040503050406030204" pitchFamily="18" charset="0"/>
+                            </a:rPr>
+                            <m:t>+</m:t>
+                          </m:r>
+                          <m:r>
+                            <a:rPr lang="en-US" i="1">
+                              <a:latin typeface="Cambria Math" panose="02040503050406030204" pitchFamily="18" charset="0"/>
+                              <a:ea typeface="Cambria Math" panose="02040503050406030204" pitchFamily="18" charset="0"/>
+                            </a:rPr>
+                            <m:t>𝛽</m:t>
+                          </m:r>
+                        </m:e>
+                        <m:sub>
+                          <m:r>
+                            <a:rPr lang="en-US" b="0" i="1" smtClean="0">
+                              <a:latin typeface="Cambria Math" panose="02040503050406030204" pitchFamily="18" charset="0"/>
+                              <a:ea typeface="Cambria Math" panose="02040503050406030204" pitchFamily="18" charset="0"/>
+                            </a:rPr>
+                            <m:t>−</m:t>
+                          </m:r>
+                          <m:r>
+                            <a:rPr lang="en-US" b="0" i="1" smtClean="0">
+                              <a:latin typeface="Cambria Math" panose="02040503050406030204" pitchFamily="18" charset="0"/>
+                              <a:ea typeface="Cambria Math" panose="02040503050406030204" pitchFamily="18" charset="0"/>
+                            </a:rPr>
+                            <m:t>𝐵</m:t>
+                          </m:r>
+                          <m:r>
+                            <a:rPr lang="en-US" i="1">
+                              <a:latin typeface="Cambria Math" panose="02040503050406030204" pitchFamily="18" charset="0"/>
+                              <a:ea typeface="Cambria Math" panose="02040503050406030204" pitchFamily="18" charset="0"/>
+                            </a:rPr>
+                            <m:t>,</m:t>
+                          </m:r>
+                          <m:r>
+                            <a:rPr lang="en-US" b="0" i="1" smtClean="0">
+                              <a:latin typeface="Cambria Math" panose="02040503050406030204" pitchFamily="18" charset="0"/>
+                              <a:ea typeface="Cambria Math" panose="02040503050406030204" pitchFamily="18" charset="0"/>
+                            </a:rPr>
+                            <m:t>−</m:t>
+                          </m:r>
+                          <m:r>
+                            <a:rPr lang="en-US" i="1">
+                              <a:latin typeface="Cambria Math" panose="02040503050406030204" pitchFamily="18" charset="0"/>
+                              <a:ea typeface="Cambria Math" panose="02040503050406030204" pitchFamily="18" charset="0"/>
+                            </a:rPr>
+                            <m:t>𝑂</m:t>
+                          </m:r>
+                        </m:sub>
+                      </m:sSub>
+                    </m:oMath>
+                  </m:oMathPara>
+                </a14:m>
+                <a:endParaRPr lang="en-US" dirty="0">
+                  <a:latin typeface="Source Sans Pro" panose="020B0503030403020204" pitchFamily="34" charset="0"/>
+                  <a:ea typeface="Source Sans Pro" panose="020B0503030403020204" pitchFamily="34" charset="0"/>
+                </a:endParaRPr>
+              </a:p>
+            </p:txBody>
+          </p:sp>
+        </mc:Choice>
+        <mc:Fallback>
+          <p:sp>
+            <p:nvSpPr>
+              <p:cNvPr id="25" name="TextBox 24">
+                <a:extLst>
+                  <a:ext uri="{FF2B5EF4-FFF2-40B4-BE49-F238E27FC236}">
+                    <a16:creationId xmlns:a16="http://schemas.microsoft.com/office/drawing/2014/main" id="{1143C91C-755A-6E77-52AA-5DD49051DAD7}"/>
+                  </a:ext>
+                </a:extLst>
+              </p:cNvPr>
+              <p:cNvSpPr txBox="1">
+                <a:spLocks noRot="1" noChangeAspect="1" noMove="1" noResize="1" noEditPoints="1" noAdjustHandles="1" noChangeArrowheads="1" noChangeShapeType="1" noTextEdit="1"/>
+              </p:cNvSpPr>
+              <p:nvPr/>
+            </p:nvSpPr>
+            <p:spPr>
+              <a:xfrm>
+                <a:off x="7543463" y="3155313"/>
+                <a:ext cx="2503378" cy="381515"/>
+              </a:xfrm>
+              <a:prstGeom prst="rect">
+                <a:avLst/>
+              </a:prstGeom>
+              <a:blipFill>
+                <a:blip r:embed="rId13"/>
+                <a:stretch>
+                  <a:fillRect b="-9677"/>
+                </a:stretch>
+              </a:blipFill>
+            </p:spPr>
+            <p:txBody>
+              <a:bodyPr/>
+              <a:lstStyle/>
+              <a:p>
+                <a:r>
+                  <a:rPr lang="en-US">
+                    <a:noFill/>
+                  </a:rPr>
+                  <a:t> </a:t>
+                </a:r>
+              </a:p>
+            </p:txBody>
+          </p:sp>
+        </mc:Fallback>
+      </mc:AlternateContent>
+      <p:sp>
+        <p:nvSpPr>
+          <p:cNvPr id="26" name="TextBox 25">
+            <a:extLst>
+              <a:ext uri="{FF2B5EF4-FFF2-40B4-BE49-F238E27FC236}">
+                <a16:creationId xmlns:a16="http://schemas.microsoft.com/office/drawing/2014/main" id="{57FF2111-8832-226B-23E3-066BA6D3C5FB}"/>
+              </a:ext>
+            </a:extLst>
+          </p:cNvPr>
+          <p:cNvSpPr txBox="1"/>
+          <p:nvPr/>
+        </p:nvSpPr>
+        <p:spPr>
+          <a:xfrm>
+            <a:off x="5845251" y="984283"/>
+            <a:ext cx="1545616" cy="369332"/>
+          </a:xfrm>
+          <a:prstGeom prst="rect">
+            <a:avLst/>
+          </a:prstGeom>
+          <a:noFill/>
+        </p:spPr>
+        <p:txBody>
+          <a:bodyPr wrap="none" rtlCol="0">
+            <a:spAutoFit/>
+          </a:bodyPr>
+          <a:lstStyle/>
+          <a:p>
+            <a:r>
+              <a:rPr lang="en-US" dirty="0">
+                <a:latin typeface="Source Sans Pro" panose="020B0503030403020204" pitchFamily="34" charset="0"/>
+                <a:ea typeface="Source Sans Pro" panose="020B0503030403020204" pitchFamily="34" charset="0"/>
+              </a:rPr>
+              <a:t>Simple effects</a:t>
+            </a:r>
+          </a:p>
+        </p:txBody>
+      </p:sp>
+      <p:sp>
+        <p:nvSpPr>
+          <p:cNvPr id="27" name="TextBox 26">
+            <a:extLst>
+              <a:ext uri="{FF2B5EF4-FFF2-40B4-BE49-F238E27FC236}">
+                <a16:creationId xmlns:a16="http://schemas.microsoft.com/office/drawing/2014/main" id="{CF57039C-2F73-D797-1B26-3C45E569A794}"/>
+              </a:ext>
+            </a:extLst>
+          </p:cNvPr>
+          <p:cNvSpPr txBox="1"/>
+          <p:nvPr/>
+        </p:nvSpPr>
+        <p:spPr>
+          <a:xfrm>
+            <a:off x="8542956" y="1622378"/>
+            <a:ext cx="1842171" cy="369332"/>
+          </a:xfrm>
+          <a:prstGeom prst="rect">
+            <a:avLst/>
+          </a:prstGeom>
+          <a:noFill/>
+        </p:spPr>
+        <p:txBody>
+          <a:bodyPr wrap="none" rtlCol="0">
+            <a:spAutoFit/>
+          </a:bodyPr>
+          <a:lstStyle/>
+          <a:p>
+            <a:r>
+              <a:rPr lang="en-US" dirty="0">
+                <a:latin typeface="Source Sans Pro" panose="020B0503030403020204" pitchFamily="34" charset="0"/>
+                <a:ea typeface="Source Sans Pro" panose="020B0503030403020204" pitchFamily="34" charset="0"/>
+              </a:rPr>
+              <a:t>interaction effect</a:t>
+            </a:r>
+          </a:p>
+        </p:txBody>
+      </p:sp>
+      <mc:AlternateContent xmlns:mc="http://schemas.openxmlformats.org/markup-compatibility/2006">
+        <mc:Choice xmlns:p14="http://schemas.microsoft.com/office/powerpoint/2010/main" Requires="p14">
+          <p:contentPart p14:bwMode="auto" r:id="rId14">
+            <p14:nvContentPartPr>
+              <p14:cNvPr id="28" name="Ink 27">
+                <a:extLst>
+                  <a:ext uri="{FF2B5EF4-FFF2-40B4-BE49-F238E27FC236}">
+                    <a16:creationId xmlns:a16="http://schemas.microsoft.com/office/drawing/2014/main" id="{10A57A6E-5797-45C9-5D7D-13E39A362C62}"/>
+                  </a:ext>
+                </a:extLst>
+              </p14:cNvPr>
+              <p14:cNvContentPartPr/>
+              <p14:nvPr/>
+            </p14:nvContentPartPr>
+            <p14:xfrm>
+              <a:off x="6078514" y="1353615"/>
+              <a:ext cx="536684" cy="1413846"/>
+            </p14:xfrm>
+          </p:contentPart>
+        </mc:Choice>
+        <mc:Fallback>
+          <p:pic>
+            <p:nvPicPr>
+              <p:cNvPr id="28" name="Ink 27">
+                <a:extLst>
+                  <a:ext uri="{FF2B5EF4-FFF2-40B4-BE49-F238E27FC236}">
+                    <a16:creationId xmlns:a16="http://schemas.microsoft.com/office/drawing/2014/main" id="{10A57A6E-5797-45C9-5D7D-13E39A362C62}"/>
+                  </a:ext>
+                </a:extLst>
+              </p:cNvPr>
+              <p:cNvPicPr/>
+              <p:nvPr/>
+            </p:nvPicPr>
+            <p:blipFill>
+              <a:blip r:embed="rId15"/>
+              <a:stretch>
+                <a:fillRect/>
+              </a:stretch>
+            </p:blipFill>
+            <p:spPr>
+              <a:xfrm>
+                <a:off x="6060517" y="1335618"/>
+                <a:ext cx="572319" cy="1449480"/>
+              </a:xfrm>
+              <a:prstGeom prst="rect">
+                <a:avLst/>
+              </a:prstGeom>
+            </p:spPr>
+          </p:pic>
+        </mc:Fallback>
+      </mc:AlternateContent>
+      <mc:AlternateContent xmlns:mc="http://schemas.openxmlformats.org/markup-compatibility/2006">
+        <mc:Choice xmlns:p14="http://schemas.microsoft.com/office/powerpoint/2010/main" Requires="p14">
+          <p:contentPart p14:bwMode="auto" r:id="rId16">
+            <p14:nvContentPartPr>
+              <p14:cNvPr id="29" name="Ink 28">
+                <a:extLst>
+                  <a:ext uri="{FF2B5EF4-FFF2-40B4-BE49-F238E27FC236}">
+                    <a16:creationId xmlns:a16="http://schemas.microsoft.com/office/drawing/2014/main" id="{B4B016FF-4013-0D92-B8B2-10A32F28EA95}"/>
+                  </a:ext>
+                </a:extLst>
+              </p14:cNvPr>
+              <p14:cNvContentPartPr/>
+              <p14:nvPr/>
+            </p14:nvContentPartPr>
+            <p14:xfrm>
+              <a:off x="6712141" y="1353615"/>
+              <a:ext cx="536685" cy="574770"/>
+            </p14:xfrm>
+          </p:contentPart>
+        </mc:Choice>
+        <mc:Fallback>
+          <p:pic>
+            <p:nvPicPr>
+              <p:cNvPr id="29" name="Ink 28">
+                <a:extLst>
+                  <a:ext uri="{FF2B5EF4-FFF2-40B4-BE49-F238E27FC236}">
+                    <a16:creationId xmlns:a16="http://schemas.microsoft.com/office/drawing/2014/main" id="{B4B016FF-4013-0D92-B8B2-10A32F28EA95}"/>
+                  </a:ext>
+                </a:extLst>
+              </p:cNvPr>
+              <p:cNvPicPr/>
+              <p:nvPr/>
+            </p:nvPicPr>
+            <p:blipFill>
+              <a:blip r:embed="rId17"/>
+              <a:stretch>
+                <a:fillRect/>
+              </a:stretch>
+            </p:blipFill>
+            <p:spPr>
+              <a:xfrm>
+                <a:off x="6694144" y="1335620"/>
+                <a:ext cx="572320" cy="610401"/>
+              </a:xfrm>
+              <a:prstGeom prst="rect">
+                <a:avLst/>
+              </a:prstGeom>
+            </p:spPr>
+          </p:pic>
+        </mc:Fallback>
+      </mc:AlternateContent>
+      <mc:AlternateContent xmlns:mc="http://schemas.openxmlformats.org/markup-compatibility/2006">
+        <mc:Choice xmlns:p14="http://schemas.microsoft.com/office/powerpoint/2010/main" Requires="p14">
+          <p:contentPart p14:bwMode="auto" r:id="rId18">
+            <p14:nvContentPartPr>
+              <p14:cNvPr id="30" name="Ink 29">
+                <a:extLst>
+                  <a:ext uri="{FF2B5EF4-FFF2-40B4-BE49-F238E27FC236}">
+                    <a16:creationId xmlns:a16="http://schemas.microsoft.com/office/drawing/2014/main" id="{401302DA-F5FD-3162-7C5C-6E08246223C3}"/>
+                  </a:ext>
+                </a:extLst>
+              </p14:cNvPr>
+              <p14:cNvContentPartPr/>
+              <p14:nvPr/>
+            </p14:nvContentPartPr>
+            <p14:xfrm>
+              <a:off x="9502552" y="1973931"/>
+              <a:ext cx="381240" cy="1173600"/>
+            </p14:xfrm>
+          </p:contentPart>
+        </mc:Choice>
+        <mc:Fallback>
+          <p:pic>
+            <p:nvPicPr>
+              <p:cNvPr id="30" name="Ink 29">
+                <a:extLst>
+                  <a:ext uri="{FF2B5EF4-FFF2-40B4-BE49-F238E27FC236}">
+                    <a16:creationId xmlns:a16="http://schemas.microsoft.com/office/drawing/2014/main" id="{401302DA-F5FD-3162-7C5C-6E08246223C3}"/>
+                  </a:ext>
+                </a:extLst>
+              </p:cNvPr>
+              <p:cNvPicPr/>
+              <p:nvPr/>
+            </p:nvPicPr>
+            <p:blipFill>
+              <a:blip r:embed="rId19"/>
+              <a:stretch>
+                <a:fillRect/>
+              </a:stretch>
+            </p:blipFill>
+            <p:spPr>
+              <a:xfrm>
+                <a:off x="9484535" y="1955931"/>
+                <a:ext cx="416914" cy="1209240"/>
+              </a:xfrm>
+              <a:prstGeom prst="rect">
+                <a:avLst/>
+              </a:prstGeom>
+            </p:spPr>
+          </p:pic>
+        </mc:Fallback>
+      </mc:AlternateContent>
+      <p:pic>
+        <p:nvPicPr>
+          <p:cNvPr id="11" name="Picture 10" descr="A graph of negative outcome&#10;&#10;Description automatically generated">
+            <a:extLst>
+              <a:ext uri="{FF2B5EF4-FFF2-40B4-BE49-F238E27FC236}">
+                <a16:creationId xmlns:a16="http://schemas.microsoft.com/office/drawing/2014/main" id="{96F53640-5B4F-B72C-FD4B-C67554898CC1}"/>
+              </a:ext>
+            </a:extLst>
+          </p:cNvPr>
+          <p:cNvPicPr>
+            <a:picLocks noChangeAspect="1"/>
+          </p:cNvPicPr>
+          <p:nvPr/>
+        </p:nvPicPr>
+        <p:blipFill rotWithShape="1">
+          <a:blip r:embed="rId2"/>
+          <a:srcRect l="77684" t="39818" r="1606" b="45030"/>
+          <a:stretch/>
+        </p:blipFill>
+        <p:spPr>
+          <a:xfrm>
+            <a:off x="4996836" y="5192904"/>
+            <a:ext cx="1609611" cy="588833"/>
+          </a:xfrm>
+          <a:prstGeom prst="rect">
+            <a:avLst/>
+          </a:prstGeom>
+        </p:spPr>
+      </p:pic>
+    </p:spTree>
+    <p:extLst>
+      <p:ext uri="{BB962C8B-B14F-4D97-AF65-F5344CB8AC3E}">
+        <p14:creationId xmlns:p14="http://schemas.microsoft.com/office/powerpoint/2010/main" val="184725224"/>
+      </p:ext>
+    </p:extLst>
+  </p:cSld>
+  <p:clrMapOvr>
+    <a:masterClrMapping/>
+  </p:clrMapOvr>
+</p:sld>
+</file>
+
+<file path=ppt/slides/slide5.xml><?xml version="1.0" encoding="utf-8"?>
 <p:sld xmlns:a="http://schemas.openxmlformats.org/drawingml/2006/main" xmlns:r="http://schemas.openxmlformats.org/officeDocument/2006/relationships" xmlns:p="http://schemas.openxmlformats.org/presentationml/2006/main">
   <p:cSld>
     <p:spTree>

</xml_diff>